<commit_message>
added exercise 2 instructions
</commit_message>
<xml_diff>
--- a/LSD07/img/figures.pptx
+++ b/LSD07/img/figures.pptx
@@ -6,6 +6,7 @@
   </p:sldMasterIdLst>
   <p:sldIdLst>
     <p:sldId id="256" r:id="rId2"/>
+    <p:sldId id="257" r:id="rId3"/>
   </p:sldIdLst>
   <p:sldSz cx="12192000" cy="6858000"/>
   <p:notesSz cx="6858000" cy="9144000"/>
@@ -104,6 +105,11 @@
       </a:defRPr>
     </a:lvl9pPr>
   </p:defaultTextStyle>
+  <p:extLst>
+    <p:ext uri="{EFAFB233-063F-42B5-8137-9DF3F51BA10A}">
+      <p15:sldGuideLst xmlns:p15="http://schemas.microsoft.com/office/powerpoint/2012/main"/>
+    </p:ext>
+  </p:extLst>
 </p:presentation>
 </file>
 
@@ -6289,10 +6295,3028 @@
           </a:p>
         </p:txBody>
       </p:sp>
+      <p:sp>
+        <p:nvSpPr>
+          <p:cNvPr id="2" name="Isosceles Triangle 1">
+            <a:extLst>
+              <a:ext uri="{FF2B5EF4-FFF2-40B4-BE49-F238E27FC236}">
+                <a16:creationId xmlns:a16="http://schemas.microsoft.com/office/drawing/2014/main" id="{737BBD63-51A3-4BD7-A230-E14D436C9BE5}"/>
+              </a:ext>
+            </a:extLst>
+          </p:cNvPr>
+          <p:cNvSpPr/>
+          <p:nvPr/>
+        </p:nvSpPr>
+        <p:spPr>
+          <a:xfrm>
+            <a:off x="5227759" y="4514850"/>
+            <a:ext cx="130137" cy="94345"/>
+          </a:xfrm>
+          <a:prstGeom prst="triangle">
+            <a:avLst/>
+          </a:prstGeom>
+          <a:noFill/>
+          <a:ln w="12700">
+            <a:solidFill>
+              <a:schemeClr val="tx1"/>
+            </a:solidFill>
+          </a:ln>
+        </p:spPr>
+        <p:style>
+          <a:lnRef idx="2">
+            <a:schemeClr val="accent1">
+              <a:shade val="50000"/>
+            </a:schemeClr>
+          </a:lnRef>
+          <a:fillRef idx="1">
+            <a:schemeClr val="accent1"/>
+          </a:fillRef>
+          <a:effectRef idx="0">
+            <a:schemeClr val="accent1"/>
+          </a:effectRef>
+          <a:fontRef idx="minor">
+            <a:schemeClr val="lt1"/>
+          </a:fontRef>
+        </p:style>
+        <p:txBody>
+          <a:bodyPr rtlCol="0" anchor="ctr"/>
+          <a:lstStyle/>
+          <a:p>
+            <a:pPr algn="ctr"/>
+            <a:endParaRPr lang="en-US"/>
+          </a:p>
+        </p:txBody>
+      </p:sp>
     </p:spTree>
     <p:extLst>
       <p:ext uri="{BB962C8B-B14F-4D97-AF65-F5344CB8AC3E}">
         <p14:creationId xmlns:p14="http://schemas.microsoft.com/office/powerpoint/2010/main" val="976447463"/>
+      </p:ext>
+    </p:extLst>
+  </p:cSld>
+  <p:clrMapOvr>
+    <a:masterClrMapping/>
+  </p:clrMapOvr>
+</p:sld>
+</file>
+
+<file path=ppt/slides/slide2.xml><?xml version="1.0" encoding="utf-8"?>
+<p:sld xmlns:a="http://schemas.openxmlformats.org/drawingml/2006/main" xmlns:r="http://schemas.openxmlformats.org/officeDocument/2006/relationships" xmlns:p="http://schemas.openxmlformats.org/presentationml/2006/main">
+  <p:cSld>
+    <p:spTree>
+      <p:nvGrpSpPr>
+        <p:cNvPr id="1" name=""/>
+        <p:cNvGrpSpPr/>
+        <p:nvPr/>
+      </p:nvGrpSpPr>
+      <p:grpSpPr>
+        <a:xfrm>
+          <a:off x="0" y="0"/>
+          <a:ext cx="0" cy="0"/>
+          <a:chOff x="0" y="0"/>
+          <a:chExt cx="0" cy="0"/>
+        </a:xfrm>
+      </p:grpSpPr>
+      <p:sp>
+        <p:nvSpPr>
+          <p:cNvPr id="4" name="Rectangle: Rounded Corners 3">
+            <a:extLst>
+              <a:ext uri="{FF2B5EF4-FFF2-40B4-BE49-F238E27FC236}">
+                <a16:creationId xmlns:a16="http://schemas.microsoft.com/office/drawing/2014/main" id="{A1A30294-6D3F-4377-B2ED-BA58388526BF}"/>
+              </a:ext>
+            </a:extLst>
+          </p:cNvPr>
+          <p:cNvSpPr/>
+          <p:nvPr/>
+        </p:nvSpPr>
+        <p:spPr>
+          <a:xfrm>
+            <a:off x="5007309" y="1938585"/>
+            <a:ext cx="1867383" cy="3029362"/>
+          </a:xfrm>
+          <a:prstGeom prst="roundRect">
+            <a:avLst>
+              <a:gd name="adj" fmla="val 2013"/>
+            </a:avLst>
+          </a:prstGeom>
+          <a:solidFill>
+            <a:schemeClr val="bg1">
+              <a:lumMod val="85000"/>
+            </a:schemeClr>
+          </a:solidFill>
+          <a:ln>
+            <a:solidFill>
+              <a:schemeClr val="tx1"/>
+            </a:solidFill>
+            <a:prstDash val="lgDash"/>
+          </a:ln>
+        </p:spPr>
+        <p:style>
+          <a:lnRef idx="2">
+            <a:schemeClr val="accent1">
+              <a:shade val="50000"/>
+            </a:schemeClr>
+          </a:lnRef>
+          <a:fillRef idx="1">
+            <a:schemeClr val="accent1"/>
+          </a:fillRef>
+          <a:effectRef idx="0">
+            <a:schemeClr val="accent1"/>
+          </a:effectRef>
+          <a:fontRef idx="minor">
+            <a:schemeClr val="lt1"/>
+          </a:fontRef>
+        </p:style>
+        <p:txBody>
+          <a:bodyPr rtlCol="0" anchor="ctr"/>
+          <a:lstStyle/>
+          <a:p>
+            <a:pPr algn="ctr"/>
+            <a:endParaRPr lang="en-US"/>
+          </a:p>
+        </p:txBody>
+      </p:sp>
+      <p:cxnSp>
+        <p:nvCxnSpPr>
+          <p:cNvPr id="6" name="Straight Connector 5">
+            <a:extLst>
+              <a:ext uri="{FF2B5EF4-FFF2-40B4-BE49-F238E27FC236}">
+                <a16:creationId xmlns:a16="http://schemas.microsoft.com/office/drawing/2014/main" id="{6B675A5D-6D38-47DC-80CB-562094C5A430}"/>
+              </a:ext>
+            </a:extLst>
+          </p:cNvPr>
+          <p:cNvCxnSpPr>
+            <a:cxnSpLocks/>
+          </p:cNvCxnSpPr>
+          <p:nvPr/>
+        </p:nvCxnSpPr>
+        <p:spPr>
+          <a:xfrm>
+            <a:off x="4541447" y="2155097"/>
+            <a:ext cx="457200" cy="0"/>
+          </a:xfrm>
+          <a:prstGeom prst="line">
+            <a:avLst/>
+          </a:prstGeom>
+          <a:ln w="19050">
+            <a:solidFill>
+              <a:schemeClr val="tx1"/>
+            </a:solidFill>
+          </a:ln>
+        </p:spPr>
+        <p:style>
+          <a:lnRef idx="1">
+            <a:schemeClr val="accent1"/>
+          </a:lnRef>
+          <a:fillRef idx="0">
+            <a:schemeClr val="accent1"/>
+          </a:fillRef>
+          <a:effectRef idx="0">
+            <a:schemeClr val="accent1"/>
+          </a:effectRef>
+          <a:fontRef idx="minor">
+            <a:schemeClr val="tx1"/>
+          </a:fontRef>
+        </p:style>
+      </p:cxnSp>
+      <p:cxnSp>
+        <p:nvCxnSpPr>
+          <p:cNvPr id="10" name="Straight Connector 9">
+            <a:extLst>
+              <a:ext uri="{FF2B5EF4-FFF2-40B4-BE49-F238E27FC236}">
+                <a16:creationId xmlns:a16="http://schemas.microsoft.com/office/drawing/2014/main" id="{244DF07C-18D4-459E-82A2-D87A69AD9128}"/>
+              </a:ext>
+            </a:extLst>
+          </p:cNvPr>
+          <p:cNvCxnSpPr>
+            <a:cxnSpLocks/>
+          </p:cNvCxnSpPr>
+          <p:nvPr/>
+        </p:nvCxnSpPr>
+        <p:spPr>
+          <a:xfrm>
+            <a:off x="4541447" y="2378874"/>
+            <a:ext cx="457200" cy="0"/>
+          </a:xfrm>
+          <a:prstGeom prst="line">
+            <a:avLst/>
+          </a:prstGeom>
+          <a:ln w="19050">
+            <a:solidFill>
+              <a:schemeClr val="tx1"/>
+            </a:solidFill>
+          </a:ln>
+        </p:spPr>
+        <p:style>
+          <a:lnRef idx="1">
+            <a:schemeClr val="accent1"/>
+          </a:lnRef>
+          <a:fillRef idx="0">
+            <a:schemeClr val="accent1"/>
+          </a:fillRef>
+          <a:effectRef idx="0">
+            <a:schemeClr val="accent1"/>
+          </a:effectRef>
+          <a:fontRef idx="minor">
+            <a:schemeClr val="tx1"/>
+          </a:fontRef>
+        </p:style>
+      </p:cxnSp>
+      <p:cxnSp>
+        <p:nvCxnSpPr>
+          <p:cNvPr id="11" name="Straight Connector 10">
+            <a:extLst>
+              <a:ext uri="{FF2B5EF4-FFF2-40B4-BE49-F238E27FC236}">
+                <a16:creationId xmlns:a16="http://schemas.microsoft.com/office/drawing/2014/main" id="{353DE4BF-179A-4DD3-A108-01596806CDE4}"/>
+              </a:ext>
+            </a:extLst>
+          </p:cNvPr>
+          <p:cNvCxnSpPr>
+            <a:cxnSpLocks/>
+          </p:cNvCxnSpPr>
+          <p:nvPr/>
+        </p:nvCxnSpPr>
+        <p:spPr>
+          <a:xfrm>
+            <a:off x="4541447" y="2602651"/>
+            <a:ext cx="457200" cy="0"/>
+          </a:xfrm>
+          <a:prstGeom prst="line">
+            <a:avLst/>
+          </a:prstGeom>
+          <a:ln w="19050">
+            <a:solidFill>
+              <a:schemeClr val="tx1"/>
+            </a:solidFill>
+          </a:ln>
+        </p:spPr>
+        <p:style>
+          <a:lnRef idx="1">
+            <a:schemeClr val="accent1"/>
+          </a:lnRef>
+          <a:fillRef idx="0">
+            <a:schemeClr val="accent1"/>
+          </a:fillRef>
+          <a:effectRef idx="0">
+            <a:schemeClr val="accent1"/>
+          </a:effectRef>
+          <a:fontRef idx="minor">
+            <a:schemeClr val="tx1"/>
+          </a:fontRef>
+        </p:style>
+      </p:cxnSp>
+      <p:cxnSp>
+        <p:nvCxnSpPr>
+          <p:cNvPr id="12" name="Straight Connector 11">
+            <a:extLst>
+              <a:ext uri="{FF2B5EF4-FFF2-40B4-BE49-F238E27FC236}">
+                <a16:creationId xmlns:a16="http://schemas.microsoft.com/office/drawing/2014/main" id="{4512899E-11F9-482C-800D-9828AA22EAD2}"/>
+              </a:ext>
+            </a:extLst>
+          </p:cNvPr>
+          <p:cNvCxnSpPr>
+            <a:cxnSpLocks/>
+          </p:cNvCxnSpPr>
+          <p:nvPr/>
+        </p:nvCxnSpPr>
+        <p:spPr>
+          <a:xfrm>
+            <a:off x="4541447" y="2826428"/>
+            <a:ext cx="457200" cy="0"/>
+          </a:xfrm>
+          <a:prstGeom prst="line">
+            <a:avLst/>
+          </a:prstGeom>
+          <a:ln w="19050">
+            <a:solidFill>
+              <a:schemeClr val="tx1"/>
+            </a:solidFill>
+          </a:ln>
+        </p:spPr>
+        <p:style>
+          <a:lnRef idx="1">
+            <a:schemeClr val="accent1"/>
+          </a:lnRef>
+          <a:fillRef idx="0">
+            <a:schemeClr val="accent1"/>
+          </a:fillRef>
+          <a:effectRef idx="0">
+            <a:schemeClr val="accent1"/>
+          </a:effectRef>
+          <a:fontRef idx="minor">
+            <a:schemeClr val="tx1"/>
+          </a:fontRef>
+        </p:style>
+      </p:cxnSp>
+      <p:cxnSp>
+        <p:nvCxnSpPr>
+          <p:cNvPr id="13" name="Straight Connector 12">
+            <a:extLst>
+              <a:ext uri="{FF2B5EF4-FFF2-40B4-BE49-F238E27FC236}">
+                <a16:creationId xmlns:a16="http://schemas.microsoft.com/office/drawing/2014/main" id="{B4669D5A-77F9-4F35-AB02-60EF6BA5FA5C}"/>
+              </a:ext>
+            </a:extLst>
+          </p:cNvPr>
+          <p:cNvCxnSpPr>
+            <a:cxnSpLocks/>
+          </p:cNvCxnSpPr>
+          <p:nvPr/>
+        </p:nvCxnSpPr>
+        <p:spPr>
+          <a:xfrm>
+            <a:off x="4541447" y="3050205"/>
+            <a:ext cx="457200" cy="0"/>
+          </a:xfrm>
+          <a:prstGeom prst="line">
+            <a:avLst/>
+          </a:prstGeom>
+          <a:ln w="19050">
+            <a:solidFill>
+              <a:schemeClr val="tx1"/>
+            </a:solidFill>
+          </a:ln>
+        </p:spPr>
+        <p:style>
+          <a:lnRef idx="1">
+            <a:schemeClr val="accent1"/>
+          </a:lnRef>
+          <a:fillRef idx="0">
+            <a:schemeClr val="accent1"/>
+          </a:fillRef>
+          <a:effectRef idx="0">
+            <a:schemeClr val="accent1"/>
+          </a:effectRef>
+          <a:fontRef idx="minor">
+            <a:schemeClr val="tx1"/>
+          </a:fontRef>
+        </p:style>
+      </p:cxnSp>
+      <p:cxnSp>
+        <p:nvCxnSpPr>
+          <p:cNvPr id="14" name="Straight Connector 13">
+            <a:extLst>
+              <a:ext uri="{FF2B5EF4-FFF2-40B4-BE49-F238E27FC236}">
+                <a16:creationId xmlns:a16="http://schemas.microsoft.com/office/drawing/2014/main" id="{331B7B13-C5F5-43DB-9FEA-1F0F6009548D}"/>
+              </a:ext>
+            </a:extLst>
+          </p:cNvPr>
+          <p:cNvCxnSpPr>
+            <a:cxnSpLocks/>
+          </p:cNvCxnSpPr>
+          <p:nvPr/>
+        </p:nvCxnSpPr>
+        <p:spPr>
+          <a:xfrm>
+            <a:off x="4541447" y="3273982"/>
+            <a:ext cx="457200" cy="0"/>
+          </a:xfrm>
+          <a:prstGeom prst="line">
+            <a:avLst/>
+          </a:prstGeom>
+          <a:ln w="19050">
+            <a:solidFill>
+              <a:schemeClr val="tx1"/>
+            </a:solidFill>
+          </a:ln>
+        </p:spPr>
+        <p:style>
+          <a:lnRef idx="1">
+            <a:schemeClr val="accent1"/>
+          </a:lnRef>
+          <a:fillRef idx="0">
+            <a:schemeClr val="accent1"/>
+          </a:fillRef>
+          <a:effectRef idx="0">
+            <a:schemeClr val="accent1"/>
+          </a:effectRef>
+          <a:fontRef idx="minor">
+            <a:schemeClr val="tx1"/>
+          </a:fontRef>
+        </p:style>
+      </p:cxnSp>
+      <p:cxnSp>
+        <p:nvCxnSpPr>
+          <p:cNvPr id="15" name="Straight Connector 14">
+            <a:extLst>
+              <a:ext uri="{FF2B5EF4-FFF2-40B4-BE49-F238E27FC236}">
+                <a16:creationId xmlns:a16="http://schemas.microsoft.com/office/drawing/2014/main" id="{232E2078-E51B-4CE2-BB4D-3717F29FF543}"/>
+              </a:ext>
+            </a:extLst>
+          </p:cNvPr>
+          <p:cNvCxnSpPr>
+            <a:cxnSpLocks/>
+          </p:cNvCxnSpPr>
+          <p:nvPr/>
+        </p:nvCxnSpPr>
+        <p:spPr>
+          <a:xfrm>
+            <a:off x="4541447" y="3497759"/>
+            <a:ext cx="457200" cy="0"/>
+          </a:xfrm>
+          <a:prstGeom prst="line">
+            <a:avLst/>
+          </a:prstGeom>
+          <a:ln w="19050">
+            <a:solidFill>
+              <a:schemeClr val="tx1"/>
+            </a:solidFill>
+          </a:ln>
+        </p:spPr>
+        <p:style>
+          <a:lnRef idx="1">
+            <a:schemeClr val="accent1"/>
+          </a:lnRef>
+          <a:fillRef idx="0">
+            <a:schemeClr val="accent1"/>
+          </a:fillRef>
+          <a:effectRef idx="0">
+            <a:schemeClr val="accent1"/>
+          </a:effectRef>
+          <a:fontRef idx="minor">
+            <a:schemeClr val="tx1"/>
+          </a:fontRef>
+        </p:style>
+      </p:cxnSp>
+      <p:cxnSp>
+        <p:nvCxnSpPr>
+          <p:cNvPr id="16" name="Straight Connector 15">
+            <a:extLst>
+              <a:ext uri="{FF2B5EF4-FFF2-40B4-BE49-F238E27FC236}">
+                <a16:creationId xmlns:a16="http://schemas.microsoft.com/office/drawing/2014/main" id="{EBE2E5CB-0F68-412F-A1A5-0A85529D2D97}"/>
+              </a:ext>
+            </a:extLst>
+          </p:cNvPr>
+          <p:cNvCxnSpPr>
+            <a:cxnSpLocks/>
+          </p:cNvCxnSpPr>
+          <p:nvPr/>
+        </p:nvCxnSpPr>
+        <p:spPr>
+          <a:xfrm>
+            <a:off x="4541447" y="3721535"/>
+            <a:ext cx="457200" cy="0"/>
+          </a:xfrm>
+          <a:prstGeom prst="line">
+            <a:avLst/>
+          </a:prstGeom>
+          <a:ln w="19050">
+            <a:solidFill>
+              <a:schemeClr val="tx1"/>
+            </a:solidFill>
+          </a:ln>
+        </p:spPr>
+        <p:style>
+          <a:lnRef idx="1">
+            <a:schemeClr val="accent1"/>
+          </a:lnRef>
+          <a:fillRef idx="0">
+            <a:schemeClr val="accent1"/>
+          </a:fillRef>
+          <a:effectRef idx="0">
+            <a:schemeClr val="accent1"/>
+          </a:effectRef>
+          <a:fontRef idx="minor">
+            <a:schemeClr val="tx1"/>
+          </a:fontRef>
+        </p:style>
+      </p:cxnSp>
+      <p:cxnSp>
+        <p:nvCxnSpPr>
+          <p:cNvPr id="19" name="Straight Connector 18">
+            <a:extLst>
+              <a:ext uri="{FF2B5EF4-FFF2-40B4-BE49-F238E27FC236}">
+                <a16:creationId xmlns:a16="http://schemas.microsoft.com/office/drawing/2014/main" id="{8D03C91A-4DCD-43A5-B38E-F7A147E08D7E}"/>
+              </a:ext>
+            </a:extLst>
+          </p:cNvPr>
+          <p:cNvCxnSpPr>
+            <a:cxnSpLocks/>
+          </p:cNvCxnSpPr>
+          <p:nvPr/>
+        </p:nvCxnSpPr>
+        <p:spPr>
+          <a:xfrm>
+            <a:off x="4541447" y="4168905"/>
+            <a:ext cx="457200" cy="0"/>
+          </a:xfrm>
+          <a:prstGeom prst="line">
+            <a:avLst/>
+          </a:prstGeom>
+          <a:ln w="19050">
+            <a:solidFill>
+              <a:schemeClr val="tx1"/>
+            </a:solidFill>
+          </a:ln>
+        </p:spPr>
+        <p:style>
+          <a:lnRef idx="1">
+            <a:schemeClr val="accent1"/>
+          </a:lnRef>
+          <a:fillRef idx="0">
+            <a:schemeClr val="accent1"/>
+          </a:fillRef>
+          <a:effectRef idx="0">
+            <a:schemeClr val="accent1"/>
+          </a:effectRef>
+          <a:fontRef idx="minor">
+            <a:schemeClr val="tx1"/>
+          </a:fontRef>
+        </p:style>
+      </p:cxnSp>
+      <p:cxnSp>
+        <p:nvCxnSpPr>
+          <p:cNvPr id="20" name="Straight Connector 19">
+            <a:extLst>
+              <a:ext uri="{FF2B5EF4-FFF2-40B4-BE49-F238E27FC236}">
+                <a16:creationId xmlns:a16="http://schemas.microsoft.com/office/drawing/2014/main" id="{11A4BBF9-474E-476D-AA56-1E5B3F3213F4}"/>
+              </a:ext>
+            </a:extLst>
+          </p:cNvPr>
+          <p:cNvCxnSpPr>
+            <a:cxnSpLocks/>
+          </p:cNvCxnSpPr>
+          <p:nvPr/>
+        </p:nvCxnSpPr>
+        <p:spPr>
+          <a:xfrm>
+            <a:off x="4541447" y="4392681"/>
+            <a:ext cx="457200" cy="0"/>
+          </a:xfrm>
+          <a:prstGeom prst="line">
+            <a:avLst/>
+          </a:prstGeom>
+          <a:ln w="19050">
+            <a:solidFill>
+              <a:schemeClr val="tx1"/>
+            </a:solidFill>
+          </a:ln>
+        </p:spPr>
+        <p:style>
+          <a:lnRef idx="1">
+            <a:schemeClr val="accent1"/>
+          </a:lnRef>
+          <a:fillRef idx="0">
+            <a:schemeClr val="accent1"/>
+          </a:fillRef>
+          <a:effectRef idx="0">
+            <a:schemeClr val="accent1"/>
+          </a:effectRef>
+          <a:fontRef idx="minor">
+            <a:schemeClr val="tx1"/>
+          </a:fontRef>
+        </p:style>
+      </p:cxnSp>
+      <p:grpSp>
+        <p:nvGrpSpPr>
+          <p:cNvPr id="42" name="Group 41">
+            <a:extLst>
+              <a:ext uri="{FF2B5EF4-FFF2-40B4-BE49-F238E27FC236}">
+                <a16:creationId xmlns:a16="http://schemas.microsoft.com/office/drawing/2014/main" id="{F4A17E2B-50D3-4848-9B54-5041E584CC12}"/>
+              </a:ext>
+            </a:extLst>
+          </p:cNvPr>
+          <p:cNvGrpSpPr/>
+          <p:nvPr/>
+        </p:nvGrpSpPr>
+        <p:grpSpPr>
+          <a:xfrm>
+            <a:off x="6869723" y="2490670"/>
+            <a:ext cx="457200" cy="1566438"/>
+            <a:chOff x="7074994" y="2330431"/>
+            <a:chExt cx="649224" cy="1566438"/>
+          </a:xfrm>
+        </p:grpSpPr>
+        <p:cxnSp>
+          <p:nvCxnSpPr>
+            <p:cNvPr id="29" name="Straight Connector 28">
+              <a:extLst>
+                <a:ext uri="{FF2B5EF4-FFF2-40B4-BE49-F238E27FC236}">
+                  <a16:creationId xmlns:a16="http://schemas.microsoft.com/office/drawing/2014/main" id="{6E4EBE80-6ABA-476C-96C5-F5C6916AF954}"/>
+                </a:ext>
+              </a:extLst>
+            </p:cNvPr>
+            <p:cNvCxnSpPr>
+              <a:cxnSpLocks/>
+            </p:cNvCxnSpPr>
+            <p:nvPr/>
+          </p:nvCxnSpPr>
+          <p:spPr>
+            <a:xfrm>
+              <a:off x="7074994" y="2330431"/>
+              <a:ext cx="649224" cy="0"/>
+            </a:xfrm>
+            <a:prstGeom prst="line">
+              <a:avLst/>
+            </a:prstGeom>
+            <a:ln w="19050">
+              <a:solidFill>
+                <a:schemeClr val="tx1"/>
+              </a:solidFill>
+            </a:ln>
+          </p:spPr>
+          <p:style>
+            <a:lnRef idx="1">
+              <a:schemeClr val="accent1"/>
+            </a:lnRef>
+            <a:fillRef idx="0">
+              <a:schemeClr val="accent1"/>
+            </a:fillRef>
+            <a:effectRef idx="0">
+              <a:schemeClr val="accent1"/>
+            </a:effectRef>
+            <a:fontRef idx="minor">
+              <a:schemeClr val="tx1"/>
+            </a:fontRef>
+          </p:style>
+        </p:cxnSp>
+        <p:cxnSp>
+          <p:nvCxnSpPr>
+            <p:cNvPr id="30" name="Straight Connector 29">
+              <a:extLst>
+                <a:ext uri="{FF2B5EF4-FFF2-40B4-BE49-F238E27FC236}">
+                  <a16:creationId xmlns:a16="http://schemas.microsoft.com/office/drawing/2014/main" id="{C6286C28-3CC5-4B78-83A4-843F9282CC45}"/>
+                </a:ext>
+              </a:extLst>
+            </p:cNvPr>
+            <p:cNvCxnSpPr>
+              <a:cxnSpLocks/>
+            </p:cNvCxnSpPr>
+            <p:nvPr/>
+          </p:nvCxnSpPr>
+          <p:spPr>
+            <a:xfrm>
+              <a:off x="7074994" y="2554208"/>
+              <a:ext cx="649224" cy="0"/>
+            </a:xfrm>
+            <a:prstGeom prst="line">
+              <a:avLst/>
+            </a:prstGeom>
+            <a:ln w="19050">
+              <a:solidFill>
+                <a:schemeClr val="tx1"/>
+              </a:solidFill>
+            </a:ln>
+          </p:spPr>
+          <p:style>
+            <a:lnRef idx="1">
+              <a:schemeClr val="accent1"/>
+            </a:lnRef>
+            <a:fillRef idx="0">
+              <a:schemeClr val="accent1"/>
+            </a:fillRef>
+            <a:effectRef idx="0">
+              <a:schemeClr val="accent1"/>
+            </a:effectRef>
+            <a:fontRef idx="minor">
+              <a:schemeClr val="tx1"/>
+            </a:fontRef>
+          </p:style>
+        </p:cxnSp>
+        <p:cxnSp>
+          <p:nvCxnSpPr>
+            <p:cNvPr id="31" name="Straight Connector 30">
+              <a:extLst>
+                <a:ext uri="{FF2B5EF4-FFF2-40B4-BE49-F238E27FC236}">
+                  <a16:creationId xmlns:a16="http://schemas.microsoft.com/office/drawing/2014/main" id="{00E1A93B-7C93-4D10-A1C4-986D2C49F421}"/>
+                </a:ext>
+              </a:extLst>
+            </p:cNvPr>
+            <p:cNvCxnSpPr>
+              <a:cxnSpLocks/>
+            </p:cNvCxnSpPr>
+            <p:nvPr/>
+          </p:nvCxnSpPr>
+          <p:spPr>
+            <a:xfrm>
+              <a:off x="7074994" y="2777985"/>
+              <a:ext cx="649224" cy="0"/>
+            </a:xfrm>
+            <a:prstGeom prst="line">
+              <a:avLst/>
+            </a:prstGeom>
+            <a:ln w="19050">
+              <a:solidFill>
+                <a:schemeClr val="tx1"/>
+              </a:solidFill>
+            </a:ln>
+          </p:spPr>
+          <p:style>
+            <a:lnRef idx="1">
+              <a:schemeClr val="accent1"/>
+            </a:lnRef>
+            <a:fillRef idx="0">
+              <a:schemeClr val="accent1"/>
+            </a:fillRef>
+            <a:effectRef idx="0">
+              <a:schemeClr val="accent1"/>
+            </a:effectRef>
+            <a:fontRef idx="minor">
+              <a:schemeClr val="tx1"/>
+            </a:fontRef>
+          </p:style>
+        </p:cxnSp>
+        <p:cxnSp>
+          <p:nvCxnSpPr>
+            <p:cNvPr id="32" name="Straight Connector 31">
+              <a:extLst>
+                <a:ext uri="{FF2B5EF4-FFF2-40B4-BE49-F238E27FC236}">
+                  <a16:creationId xmlns:a16="http://schemas.microsoft.com/office/drawing/2014/main" id="{52878300-23D8-4C34-A758-545A9620C8DE}"/>
+                </a:ext>
+              </a:extLst>
+            </p:cNvPr>
+            <p:cNvCxnSpPr>
+              <a:cxnSpLocks/>
+            </p:cNvCxnSpPr>
+            <p:nvPr/>
+          </p:nvCxnSpPr>
+          <p:spPr>
+            <a:xfrm>
+              <a:off x="7074994" y="3001762"/>
+              <a:ext cx="649224" cy="0"/>
+            </a:xfrm>
+            <a:prstGeom prst="line">
+              <a:avLst/>
+            </a:prstGeom>
+            <a:ln w="19050">
+              <a:solidFill>
+                <a:schemeClr val="tx1"/>
+              </a:solidFill>
+            </a:ln>
+          </p:spPr>
+          <p:style>
+            <a:lnRef idx="1">
+              <a:schemeClr val="accent1"/>
+            </a:lnRef>
+            <a:fillRef idx="0">
+              <a:schemeClr val="accent1"/>
+            </a:fillRef>
+            <a:effectRef idx="0">
+              <a:schemeClr val="accent1"/>
+            </a:effectRef>
+            <a:fontRef idx="minor">
+              <a:schemeClr val="tx1"/>
+            </a:fontRef>
+          </p:style>
+        </p:cxnSp>
+        <p:cxnSp>
+          <p:nvCxnSpPr>
+            <p:cNvPr id="33" name="Straight Connector 32">
+              <a:extLst>
+                <a:ext uri="{FF2B5EF4-FFF2-40B4-BE49-F238E27FC236}">
+                  <a16:creationId xmlns:a16="http://schemas.microsoft.com/office/drawing/2014/main" id="{2C30E594-E301-4A0B-9552-782A8D20568E}"/>
+                </a:ext>
+              </a:extLst>
+            </p:cNvPr>
+            <p:cNvCxnSpPr>
+              <a:cxnSpLocks/>
+            </p:cNvCxnSpPr>
+            <p:nvPr/>
+          </p:nvCxnSpPr>
+          <p:spPr>
+            <a:xfrm>
+              <a:off x="7074994" y="3225539"/>
+              <a:ext cx="649224" cy="0"/>
+            </a:xfrm>
+            <a:prstGeom prst="line">
+              <a:avLst/>
+            </a:prstGeom>
+            <a:ln w="19050">
+              <a:solidFill>
+                <a:schemeClr val="tx1"/>
+              </a:solidFill>
+            </a:ln>
+          </p:spPr>
+          <p:style>
+            <a:lnRef idx="1">
+              <a:schemeClr val="accent1"/>
+            </a:lnRef>
+            <a:fillRef idx="0">
+              <a:schemeClr val="accent1"/>
+            </a:fillRef>
+            <a:effectRef idx="0">
+              <a:schemeClr val="accent1"/>
+            </a:effectRef>
+            <a:fontRef idx="minor">
+              <a:schemeClr val="tx1"/>
+            </a:fontRef>
+          </p:style>
+        </p:cxnSp>
+        <p:cxnSp>
+          <p:nvCxnSpPr>
+            <p:cNvPr id="34" name="Straight Connector 33">
+              <a:extLst>
+                <a:ext uri="{FF2B5EF4-FFF2-40B4-BE49-F238E27FC236}">
+                  <a16:creationId xmlns:a16="http://schemas.microsoft.com/office/drawing/2014/main" id="{87B091FB-48DC-4025-AE11-E77B63413D7E}"/>
+                </a:ext>
+              </a:extLst>
+            </p:cNvPr>
+            <p:cNvCxnSpPr>
+              <a:cxnSpLocks/>
+            </p:cNvCxnSpPr>
+            <p:nvPr/>
+          </p:nvCxnSpPr>
+          <p:spPr>
+            <a:xfrm>
+              <a:off x="7074994" y="3449316"/>
+              <a:ext cx="649224" cy="0"/>
+            </a:xfrm>
+            <a:prstGeom prst="line">
+              <a:avLst/>
+            </a:prstGeom>
+            <a:ln w="19050">
+              <a:solidFill>
+                <a:schemeClr val="tx1"/>
+              </a:solidFill>
+            </a:ln>
+          </p:spPr>
+          <p:style>
+            <a:lnRef idx="1">
+              <a:schemeClr val="accent1"/>
+            </a:lnRef>
+            <a:fillRef idx="0">
+              <a:schemeClr val="accent1"/>
+            </a:fillRef>
+            <a:effectRef idx="0">
+              <a:schemeClr val="accent1"/>
+            </a:effectRef>
+            <a:fontRef idx="minor">
+              <a:schemeClr val="tx1"/>
+            </a:fontRef>
+          </p:style>
+        </p:cxnSp>
+        <p:cxnSp>
+          <p:nvCxnSpPr>
+            <p:cNvPr id="35" name="Straight Connector 34">
+              <a:extLst>
+                <a:ext uri="{FF2B5EF4-FFF2-40B4-BE49-F238E27FC236}">
+                  <a16:creationId xmlns:a16="http://schemas.microsoft.com/office/drawing/2014/main" id="{BAC6D713-0205-4F8C-9E39-936EDA6FF075}"/>
+                </a:ext>
+              </a:extLst>
+            </p:cNvPr>
+            <p:cNvCxnSpPr>
+              <a:cxnSpLocks/>
+            </p:cNvCxnSpPr>
+            <p:nvPr/>
+          </p:nvCxnSpPr>
+          <p:spPr>
+            <a:xfrm>
+              <a:off x="7074994" y="3673093"/>
+              <a:ext cx="649224" cy="0"/>
+            </a:xfrm>
+            <a:prstGeom prst="line">
+              <a:avLst/>
+            </a:prstGeom>
+            <a:ln w="19050">
+              <a:solidFill>
+                <a:schemeClr val="tx1"/>
+              </a:solidFill>
+            </a:ln>
+          </p:spPr>
+          <p:style>
+            <a:lnRef idx="1">
+              <a:schemeClr val="accent1"/>
+            </a:lnRef>
+            <a:fillRef idx="0">
+              <a:schemeClr val="accent1"/>
+            </a:fillRef>
+            <a:effectRef idx="0">
+              <a:schemeClr val="accent1"/>
+            </a:effectRef>
+            <a:fontRef idx="minor">
+              <a:schemeClr val="tx1"/>
+            </a:fontRef>
+          </p:style>
+        </p:cxnSp>
+        <p:cxnSp>
+          <p:nvCxnSpPr>
+            <p:cNvPr id="36" name="Straight Connector 35">
+              <a:extLst>
+                <a:ext uri="{FF2B5EF4-FFF2-40B4-BE49-F238E27FC236}">
+                  <a16:creationId xmlns:a16="http://schemas.microsoft.com/office/drawing/2014/main" id="{D45415E1-82FC-47CD-8246-6766046B9363}"/>
+                </a:ext>
+              </a:extLst>
+            </p:cNvPr>
+            <p:cNvCxnSpPr>
+              <a:cxnSpLocks/>
+            </p:cNvCxnSpPr>
+            <p:nvPr/>
+          </p:nvCxnSpPr>
+          <p:spPr>
+            <a:xfrm>
+              <a:off x="7074994" y="3896869"/>
+              <a:ext cx="649224" cy="0"/>
+            </a:xfrm>
+            <a:prstGeom prst="line">
+              <a:avLst/>
+            </a:prstGeom>
+            <a:ln w="19050">
+              <a:solidFill>
+                <a:schemeClr val="tx1"/>
+              </a:solidFill>
+            </a:ln>
+          </p:spPr>
+          <p:style>
+            <a:lnRef idx="1">
+              <a:schemeClr val="accent1"/>
+            </a:lnRef>
+            <a:fillRef idx="0">
+              <a:schemeClr val="accent1"/>
+            </a:fillRef>
+            <a:effectRef idx="0">
+              <a:schemeClr val="accent1"/>
+            </a:effectRef>
+            <a:fontRef idx="minor">
+              <a:schemeClr val="tx1"/>
+            </a:fontRef>
+          </p:style>
+        </p:cxnSp>
+      </p:grpSp>
+      <p:cxnSp>
+        <p:nvCxnSpPr>
+          <p:cNvPr id="41" name="Straight Connector 40">
+            <a:extLst>
+              <a:ext uri="{FF2B5EF4-FFF2-40B4-BE49-F238E27FC236}">
+                <a16:creationId xmlns:a16="http://schemas.microsoft.com/office/drawing/2014/main" id="{9BFAB10A-92B3-4F8F-A235-EE9ECBCCCB79}"/>
+              </a:ext>
+            </a:extLst>
+          </p:cNvPr>
+          <p:cNvCxnSpPr>
+            <a:cxnSpLocks/>
+          </p:cNvCxnSpPr>
+          <p:nvPr/>
+        </p:nvCxnSpPr>
+        <p:spPr>
+          <a:xfrm rot="5400000">
+            <a:off x="5065646" y="5191723"/>
+            <a:ext cx="457200" cy="0"/>
+          </a:xfrm>
+          <a:prstGeom prst="line">
+            <a:avLst/>
+          </a:prstGeom>
+          <a:ln w="19050">
+            <a:solidFill>
+              <a:schemeClr val="tx1"/>
+            </a:solidFill>
+          </a:ln>
+        </p:spPr>
+        <p:style>
+          <a:lnRef idx="1">
+            <a:schemeClr val="accent1"/>
+          </a:lnRef>
+          <a:fillRef idx="0">
+            <a:schemeClr val="accent1"/>
+          </a:fillRef>
+          <a:effectRef idx="0">
+            <a:schemeClr val="accent1"/>
+          </a:effectRef>
+          <a:fontRef idx="minor">
+            <a:schemeClr val="tx1"/>
+          </a:fontRef>
+        </p:style>
+      </p:cxnSp>
+      <p:grpSp>
+        <p:nvGrpSpPr>
+          <p:cNvPr id="66" name="Group 65">
+            <a:extLst>
+              <a:ext uri="{FF2B5EF4-FFF2-40B4-BE49-F238E27FC236}">
+                <a16:creationId xmlns:a16="http://schemas.microsoft.com/office/drawing/2014/main" id="{C113F0A6-C69A-4436-B7D8-9ADF8DA814DF}"/>
+              </a:ext>
+            </a:extLst>
+          </p:cNvPr>
+          <p:cNvGrpSpPr/>
+          <p:nvPr/>
+        </p:nvGrpSpPr>
+        <p:grpSpPr>
+          <a:xfrm>
+            <a:off x="5513928" y="2177698"/>
+            <a:ext cx="854144" cy="1071127"/>
+            <a:chOff x="6163641" y="850352"/>
+            <a:chExt cx="854144" cy="1071127"/>
+          </a:xfrm>
+        </p:grpSpPr>
+        <p:sp>
+          <p:nvSpPr>
+            <p:cNvPr id="45" name="Rectangle: Rounded Corners 44">
+              <a:extLst>
+                <a:ext uri="{FF2B5EF4-FFF2-40B4-BE49-F238E27FC236}">
+                  <a16:creationId xmlns:a16="http://schemas.microsoft.com/office/drawing/2014/main" id="{1B00A8FD-3D7D-46E4-9897-0D52BB93473C}"/>
+                </a:ext>
+              </a:extLst>
+            </p:cNvPr>
+            <p:cNvSpPr/>
+            <p:nvPr/>
+          </p:nvSpPr>
+          <p:spPr>
+            <a:xfrm>
+              <a:off x="6365631" y="850353"/>
+              <a:ext cx="450164" cy="1049876"/>
+            </a:xfrm>
+            <a:prstGeom prst="roundRect">
+              <a:avLst>
+                <a:gd name="adj" fmla="val 2013"/>
+              </a:avLst>
+            </a:prstGeom>
+            <a:solidFill>
+              <a:schemeClr val="tx1">
+                <a:lumMod val="85000"/>
+                <a:lumOff val="15000"/>
+              </a:schemeClr>
+            </a:solidFill>
+            <a:ln>
+              <a:noFill/>
+            </a:ln>
+          </p:spPr>
+          <p:style>
+            <a:lnRef idx="2">
+              <a:schemeClr val="accent1">
+                <a:shade val="50000"/>
+              </a:schemeClr>
+            </a:lnRef>
+            <a:fillRef idx="1">
+              <a:schemeClr val="accent1"/>
+            </a:fillRef>
+            <a:effectRef idx="0">
+              <a:schemeClr val="accent1"/>
+            </a:effectRef>
+            <a:fontRef idx="minor">
+              <a:schemeClr val="lt1"/>
+            </a:fontRef>
+          </p:style>
+          <p:txBody>
+            <a:bodyPr rtlCol="0" anchor="ctr"/>
+            <a:lstStyle/>
+            <a:p>
+              <a:pPr algn="ctr"/>
+              <a:endParaRPr lang="en-US"/>
+            </a:p>
+          </p:txBody>
+        </p:sp>
+        <p:grpSp>
+          <p:nvGrpSpPr>
+            <p:cNvPr id="59" name="Group 58">
+              <a:extLst>
+                <a:ext uri="{FF2B5EF4-FFF2-40B4-BE49-F238E27FC236}">
+                  <a16:creationId xmlns:a16="http://schemas.microsoft.com/office/drawing/2014/main" id="{3410E062-1E2C-4EC0-B82D-5731D1FA069A}"/>
+                </a:ext>
+              </a:extLst>
+            </p:cNvPr>
+            <p:cNvGrpSpPr/>
+            <p:nvPr/>
+          </p:nvGrpSpPr>
+          <p:grpSpPr>
+            <a:xfrm>
+              <a:off x="6163641" y="1039626"/>
+              <a:ext cx="201990" cy="671331"/>
+              <a:chOff x="5713837" y="3767509"/>
+              <a:chExt cx="649224" cy="671331"/>
+            </a:xfrm>
+          </p:grpSpPr>
+          <p:cxnSp>
+            <p:nvCxnSpPr>
+              <p:cNvPr id="55" name="Straight Connector 54">
+                <a:extLst>
+                  <a:ext uri="{FF2B5EF4-FFF2-40B4-BE49-F238E27FC236}">
+                    <a16:creationId xmlns:a16="http://schemas.microsoft.com/office/drawing/2014/main" id="{08AA5024-ABE7-4332-BF5F-CB861C15B1B5}"/>
+                  </a:ext>
+                </a:extLst>
+              </p:cNvPr>
+              <p:cNvCxnSpPr>
+                <a:cxnSpLocks/>
+              </p:cNvCxnSpPr>
+              <p:nvPr/>
+            </p:nvCxnSpPr>
+            <p:spPr>
+              <a:xfrm>
+                <a:off x="5713837" y="3767509"/>
+                <a:ext cx="649224" cy="0"/>
+              </a:xfrm>
+              <a:prstGeom prst="line">
+                <a:avLst/>
+              </a:prstGeom>
+              <a:ln w="19050">
+                <a:solidFill>
+                  <a:schemeClr val="tx1"/>
+                </a:solidFill>
+              </a:ln>
+            </p:spPr>
+            <p:style>
+              <a:lnRef idx="1">
+                <a:schemeClr val="accent1"/>
+              </a:lnRef>
+              <a:fillRef idx="0">
+                <a:schemeClr val="accent1"/>
+              </a:fillRef>
+              <a:effectRef idx="0">
+                <a:schemeClr val="accent1"/>
+              </a:effectRef>
+              <a:fontRef idx="minor">
+                <a:schemeClr val="tx1"/>
+              </a:fontRef>
+            </p:style>
+          </p:cxnSp>
+          <p:cxnSp>
+            <p:nvCxnSpPr>
+              <p:cNvPr id="56" name="Straight Connector 55">
+                <a:extLst>
+                  <a:ext uri="{FF2B5EF4-FFF2-40B4-BE49-F238E27FC236}">
+                    <a16:creationId xmlns:a16="http://schemas.microsoft.com/office/drawing/2014/main" id="{F34EFBEE-A2E8-4036-9EA0-234503CF3B0F}"/>
+                  </a:ext>
+                </a:extLst>
+              </p:cNvPr>
+              <p:cNvCxnSpPr>
+                <a:cxnSpLocks/>
+              </p:cNvCxnSpPr>
+              <p:nvPr/>
+            </p:nvCxnSpPr>
+            <p:spPr>
+              <a:xfrm>
+                <a:off x="5713837" y="3991286"/>
+                <a:ext cx="649224" cy="0"/>
+              </a:xfrm>
+              <a:prstGeom prst="line">
+                <a:avLst/>
+              </a:prstGeom>
+              <a:ln w="19050">
+                <a:solidFill>
+                  <a:schemeClr val="tx1"/>
+                </a:solidFill>
+              </a:ln>
+            </p:spPr>
+            <p:style>
+              <a:lnRef idx="1">
+                <a:schemeClr val="accent1"/>
+              </a:lnRef>
+              <a:fillRef idx="0">
+                <a:schemeClr val="accent1"/>
+              </a:fillRef>
+              <a:effectRef idx="0">
+                <a:schemeClr val="accent1"/>
+              </a:effectRef>
+              <a:fontRef idx="minor">
+                <a:schemeClr val="tx1"/>
+              </a:fontRef>
+            </p:style>
+          </p:cxnSp>
+          <p:cxnSp>
+            <p:nvCxnSpPr>
+              <p:cNvPr id="57" name="Straight Connector 56">
+                <a:extLst>
+                  <a:ext uri="{FF2B5EF4-FFF2-40B4-BE49-F238E27FC236}">
+                    <a16:creationId xmlns:a16="http://schemas.microsoft.com/office/drawing/2014/main" id="{112A59D5-047B-4526-90A1-77C1B243596D}"/>
+                  </a:ext>
+                </a:extLst>
+              </p:cNvPr>
+              <p:cNvCxnSpPr>
+                <a:cxnSpLocks/>
+              </p:cNvCxnSpPr>
+              <p:nvPr/>
+            </p:nvCxnSpPr>
+            <p:spPr>
+              <a:xfrm>
+                <a:off x="5713837" y="4215063"/>
+                <a:ext cx="649224" cy="0"/>
+              </a:xfrm>
+              <a:prstGeom prst="line">
+                <a:avLst/>
+              </a:prstGeom>
+              <a:ln w="19050">
+                <a:solidFill>
+                  <a:schemeClr val="tx1"/>
+                </a:solidFill>
+              </a:ln>
+            </p:spPr>
+            <p:style>
+              <a:lnRef idx="1">
+                <a:schemeClr val="accent1"/>
+              </a:lnRef>
+              <a:fillRef idx="0">
+                <a:schemeClr val="accent1"/>
+              </a:fillRef>
+              <a:effectRef idx="0">
+                <a:schemeClr val="accent1"/>
+              </a:effectRef>
+              <a:fontRef idx="minor">
+                <a:schemeClr val="tx1"/>
+              </a:fontRef>
+            </p:style>
+          </p:cxnSp>
+          <p:cxnSp>
+            <p:nvCxnSpPr>
+              <p:cNvPr id="58" name="Straight Connector 57">
+                <a:extLst>
+                  <a:ext uri="{FF2B5EF4-FFF2-40B4-BE49-F238E27FC236}">
+                    <a16:creationId xmlns:a16="http://schemas.microsoft.com/office/drawing/2014/main" id="{4782B376-1B58-4D78-9568-F29D76715976}"/>
+                  </a:ext>
+                </a:extLst>
+              </p:cNvPr>
+              <p:cNvCxnSpPr>
+                <a:cxnSpLocks/>
+              </p:cNvCxnSpPr>
+              <p:nvPr/>
+            </p:nvCxnSpPr>
+            <p:spPr>
+              <a:xfrm>
+                <a:off x="5713837" y="4438840"/>
+                <a:ext cx="649224" cy="0"/>
+              </a:xfrm>
+              <a:prstGeom prst="line">
+                <a:avLst/>
+              </a:prstGeom>
+              <a:ln w="19050">
+                <a:solidFill>
+                  <a:schemeClr val="tx1"/>
+                </a:solidFill>
+              </a:ln>
+            </p:spPr>
+            <p:style>
+              <a:lnRef idx="1">
+                <a:schemeClr val="accent1"/>
+              </a:lnRef>
+              <a:fillRef idx="0">
+                <a:schemeClr val="accent1"/>
+              </a:fillRef>
+              <a:effectRef idx="0">
+                <a:schemeClr val="accent1"/>
+              </a:effectRef>
+              <a:fontRef idx="minor">
+                <a:schemeClr val="tx1"/>
+              </a:fontRef>
+            </p:style>
+          </p:cxnSp>
+        </p:grpSp>
+        <p:grpSp>
+          <p:nvGrpSpPr>
+            <p:cNvPr id="60" name="Group 59">
+              <a:extLst>
+                <a:ext uri="{FF2B5EF4-FFF2-40B4-BE49-F238E27FC236}">
+                  <a16:creationId xmlns:a16="http://schemas.microsoft.com/office/drawing/2014/main" id="{9AC5CA20-E6E7-4A92-A56E-4CA4CA1299F4}"/>
+                </a:ext>
+              </a:extLst>
+            </p:cNvPr>
+            <p:cNvGrpSpPr/>
+            <p:nvPr/>
+          </p:nvGrpSpPr>
+          <p:grpSpPr>
+            <a:xfrm>
+              <a:off x="6815795" y="1039626"/>
+              <a:ext cx="201990" cy="671331"/>
+              <a:chOff x="5713837" y="3767509"/>
+              <a:chExt cx="649224" cy="671331"/>
+            </a:xfrm>
+          </p:grpSpPr>
+          <p:cxnSp>
+            <p:nvCxnSpPr>
+              <p:cNvPr id="61" name="Straight Connector 60">
+                <a:extLst>
+                  <a:ext uri="{FF2B5EF4-FFF2-40B4-BE49-F238E27FC236}">
+                    <a16:creationId xmlns:a16="http://schemas.microsoft.com/office/drawing/2014/main" id="{0ED8FE6D-648A-41F3-820C-109C14202FEC}"/>
+                  </a:ext>
+                </a:extLst>
+              </p:cNvPr>
+              <p:cNvCxnSpPr>
+                <a:cxnSpLocks/>
+              </p:cNvCxnSpPr>
+              <p:nvPr/>
+            </p:nvCxnSpPr>
+            <p:spPr>
+              <a:xfrm>
+                <a:off x="5713837" y="3767509"/>
+                <a:ext cx="649224" cy="0"/>
+              </a:xfrm>
+              <a:prstGeom prst="line">
+                <a:avLst/>
+              </a:prstGeom>
+              <a:ln w="19050">
+                <a:solidFill>
+                  <a:schemeClr val="tx1"/>
+                </a:solidFill>
+              </a:ln>
+            </p:spPr>
+            <p:style>
+              <a:lnRef idx="1">
+                <a:schemeClr val="accent1"/>
+              </a:lnRef>
+              <a:fillRef idx="0">
+                <a:schemeClr val="accent1"/>
+              </a:fillRef>
+              <a:effectRef idx="0">
+                <a:schemeClr val="accent1"/>
+              </a:effectRef>
+              <a:fontRef idx="minor">
+                <a:schemeClr val="tx1"/>
+              </a:fontRef>
+            </p:style>
+          </p:cxnSp>
+          <p:cxnSp>
+            <p:nvCxnSpPr>
+              <p:cNvPr id="62" name="Straight Connector 61">
+                <a:extLst>
+                  <a:ext uri="{FF2B5EF4-FFF2-40B4-BE49-F238E27FC236}">
+                    <a16:creationId xmlns:a16="http://schemas.microsoft.com/office/drawing/2014/main" id="{166600A0-7DB4-4940-A74F-50620696300A}"/>
+                  </a:ext>
+                </a:extLst>
+              </p:cNvPr>
+              <p:cNvCxnSpPr>
+                <a:cxnSpLocks/>
+              </p:cNvCxnSpPr>
+              <p:nvPr/>
+            </p:nvCxnSpPr>
+            <p:spPr>
+              <a:xfrm>
+                <a:off x="5713837" y="3991286"/>
+                <a:ext cx="649224" cy="0"/>
+              </a:xfrm>
+              <a:prstGeom prst="line">
+                <a:avLst/>
+              </a:prstGeom>
+              <a:ln w="19050">
+                <a:solidFill>
+                  <a:schemeClr val="tx1"/>
+                </a:solidFill>
+              </a:ln>
+            </p:spPr>
+            <p:style>
+              <a:lnRef idx="1">
+                <a:schemeClr val="accent1"/>
+              </a:lnRef>
+              <a:fillRef idx="0">
+                <a:schemeClr val="accent1"/>
+              </a:fillRef>
+              <a:effectRef idx="0">
+                <a:schemeClr val="accent1"/>
+              </a:effectRef>
+              <a:fontRef idx="minor">
+                <a:schemeClr val="tx1"/>
+              </a:fontRef>
+            </p:style>
+          </p:cxnSp>
+          <p:cxnSp>
+            <p:nvCxnSpPr>
+              <p:cNvPr id="63" name="Straight Connector 62">
+                <a:extLst>
+                  <a:ext uri="{FF2B5EF4-FFF2-40B4-BE49-F238E27FC236}">
+                    <a16:creationId xmlns:a16="http://schemas.microsoft.com/office/drawing/2014/main" id="{BCDA409D-9BEA-4FAB-8D08-1903EEB0A05D}"/>
+                  </a:ext>
+                </a:extLst>
+              </p:cNvPr>
+              <p:cNvCxnSpPr>
+                <a:cxnSpLocks/>
+              </p:cNvCxnSpPr>
+              <p:nvPr/>
+            </p:nvCxnSpPr>
+            <p:spPr>
+              <a:xfrm>
+                <a:off x="5713837" y="4215063"/>
+                <a:ext cx="649224" cy="0"/>
+              </a:xfrm>
+              <a:prstGeom prst="line">
+                <a:avLst/>
+              </a:prstGeom>
+              <a:ln w="19050">
+                <a:solidFill>
+                  <a:schemeClr val="tx1"/>
+                </a:solidFill>
+              </a:ln>
+            </p:spPr>
+            <p:style>
+              <a:lnRef idx="1">
+                <a:schemeClr val="accent1"/>
+              </a:lnRef>
+              <a:fillRef idx="0">
+                <a:schemeClr val="accent1"/>
+              </a:fillRef>
+              <a:effectRef idx="0">
+                <a:schemeClr val="accent1"/>
+              </a:effectRef>
+              <a:fontRef idx="minor">
+                <a:schemeClr val="tx1"/>
+              </a:fontRef>
+            </p:style>
+          </p:cxnSp>
+          <p:cxnSp>
+            <p:nvCxnSpPr>
+              <p:cNvPr id="64" name="Straight Connector 63">
+                <a:extLst>
+                  <a:ext uri="{FF2B5EF4-FFF2-40B4-BE49-F238E27FC236}">
+                    <a16:creationId xmlns:a16="http://schemas.microsoft.com/office/drawing/2014/main" id="{6FD1B29A-CF4A-4CD9-B8F3-C23AC69A7CFB}"/>
+                  </a:ext>
+                </a:extLst>
+              </p:cNvPr>
+              <p:cNvCxnSpPr>
+                <a:cxnSpLocks/>
+              </p:cNvCxnSpPr>
+              <p:nvPr/>
+            </p:nvCxnSpPr>
+            <p:spPr>
+              <a:xfrm>
+                <a:off x="5713837" y="4438840"/>
+                <a:ext cx="649224" cy="0"/>
+              </a:xfrm>
+              <a:prstGeom prst="line">
+                <a:avLst/>
+              </a:prstGeom>
+              <a:ln w="19050">
+                <a:solidFill>
+                  <a:schemeClr val="tx1"/>
+                </a:solidFill>
+              </a:ln>
+            </p:spPr>
+            <p:style>
+              <a:lnRef idx="1">
+                <a:schemeClr val="accent1"/>
+              </a:lnRef>
+              <a:fillRef idx="0">
+                <a:schemeClr val="accent1"/>
+              </a:fillRef>
+              <a:effectRef idx="0">
+                <a:schemeClr val="accent1"/>
+              </a:effectRef>
+              <a:fontRef idx="minor">
+                <a:schemeClr val="tx1"/>
+              </a:fontRef>
+            </p:style>
+          </p:cxnSp>
+        </p:grpSp>
+        <p:sp>
+          <p:nvSpPr>
+            <p:cNvPr id="65" name="TextBox 64">
+              <a:extLst>
+                <a:ext uri="{FF2B5EF4-FFF2-40B4-BE49-F238E27FC236}">
+                  <a16:creationId xmlns:a16="http://schemas.microsoft.com/office/drawing/2014/main" id="{62B93F84-23F0-4985-BCFF-F6D4F9C5EF54}"/>
+                </a:ext>
+              </a:extLst>
+            </p:cNvPr>
+            <p:cNvSpPr txBox="1"/>
+            <p:nvPr/>
+          </p:nvSpPr>
+          <p:spPr>
+            <a:xfrm rot="16200000">
+              <a:off x="6032058" y="1201250"/>
+              <a:ext cx="1071127" cy="369332"/>
+            </a:xfrm>
+            <a:prstGeom prst="rect">
+              <a:avLst/>
+            </a:prstGeom>
+            <a:noFill/>
+          </p:spPr>
+          <p:txBody>
+            <a:bodyPr wrap="none" rtlCol="0">
+              <a:spAutoFit/>
+            </a:bodyPr>
+            <a:lstStyle/>
+            <a:p>
+              <a:r>
+                <a:rPr lang="en-US">
+                  <a:solidFill>
+                    <a:schemeClr val="bg1"/>
+                  </a:solidFill>
+                  <a:latin typeface="Anonymous Pro" panose="02060609030202000504" pitchFamily="49" charset="0"/>
+                  <a:ea typeface="Anonymous Pro" panose="02060609030202000504" pitchFamily="49" charset="0"/>
+                </a:rPr>
+                <a:t>74LS169</a:t>
+              </a:r>
+            </a:p>
+          </p:txBody>
+        </p:sp>
+      </p:grpSp>
+      <p:grpSp>
+        <p:nvGrpSpPr>
+          <p:cNvPr id="67" name="Group 66">
+            <a:extLst>
+              <a:ext uri="{FF2B5EF4-FFF2-40B4-BE49-F238E27FC236}">
+                <a16:creationId xmlns:a16="http://schemas.microsoft.com/office/drawing/2014/main" id="{40DD3583-B564-4368-ABF9-5DBD0A1F41BF}"/>
+              </a:ext>
+            </a:extLst>
+          </p:cNvPr>
+          <p:cNvGrpSpPr/>
+          <p:nvPr/>
+        </p:nvGrpSpPr>
+        <p:grpSpPr>
+          <a:xfrm>
+            <a:off x="5513928" y="3321554"/>
+            <a:ext cx="854144" cy="1071127"/>
+            <a:chOff x="6163641" y="850352"/>
+            <a:chExt cx="854144" cy="1071127"/>
+          </a:xfrm>
+        </p:grpSpPr>
+        <p:sp>
+          <p:nvSpPr>
+            <p:cNvPr id="68" name="Rectangle: Rounded Corners 67">
+              <a:extLst>
+                <a:ext uri="{FF2B5EF4-FFF2-40B4-BE49-F238E27FC236}">
+                  <a16:creationId xmlns:a16="http://schemas.microsoft.com/office/drawing/2014/main" id="{ACD193AA-FA0B-4D40-8FD9-BA38AE86DC13}"/>
+                </a:ext>
+              </a:extLst>
+            </p:cNvPr>
+            <p:cNvSpPr/>
+            <p:nvPr/>
+          </p:nvSpPr>
+          <p:spPr>
+            <a:xfrm>
+              <a:off x="6365631" y="850353"/>
+              <a:ext cx="450164" cy="1049876"/>
+            </a:xfrm>
+            <a:prstGeom prst="roundRect">
+              <a:avLst>
+                <a:gd name="adj" fmla="val 2013"/>
+              </a:avLst>
+            </a:prstGeom>
+            <a:solidFill>
+              <a:schemeClr val="tx1">
+                <a:lumMod val="85000"/>
+                <a:lumOff val="15000"/>
+              </a:schemeClr>
+            </a:solidFill>
+            <a:ln>
+              <a:noFill/>
+            </a:ln>
+          </p:spPr>
+          <p:style>
+            <a:lnRef idx="2">
+              <a:schemeClr val="accent1">
+                <a:shade val="50000"/>
+              </a:schemeClr>
+            </a:lnRef>
+            <a:fillRef idx="1">
+              <a:schemeClr val="accent1"/>
+            </a:fillRef>
+            <a:effectRef idx="0">
+              <a:schemeClr val="accent1"/>
+            </a:effectRef>
+            <a:fontRef idx="minor">
+              <a:schemeClr val="lt1"/>
+            </a:fontRef>
+          </p:style>
+          <p:txBody>
+            <a:bodyPr rtlCol="0" anchor="ctr"/>
+            <a:lstStyle/>
+            <a:p>
+              <a:pPr algn="ctr"/>
+              <a:endParaRPr lang="en-US"/>
+            </a:p>
+          </p:txBody>
+        </p:sp>
+        <p:grpSp>
+          <p:nvGrpSpPr>
+            <p:cNvPr id="69" name="Group 68">
+              <a:extLst>
+                <a:ext uri="{FF2B5EF4-FFF2-40B4-BE49-F238E27FC236}">
+                  <a16:creationId xmlns:a16="http://schemas.microsoft.com/office/drawing/2014/main" id="{67625B4C-CDA8-443A-93AA-1E30F9A664A0}"/>
+                </a:ext>
+              </a:extLst>
+            </p:cNvPr>
+            <p:cNvGrpSpPr/>
+            <p:nvPr/>
+          </p:nvGrpSpPr>
+          <p:grpSpPr>
+            <a:xfrm>
+              <a:off x="6163641" y="1039626"/>
+              <a:ext cx="201990" cy="671331"/>
+              <a:chOff x="5713837" y="3767509"/>
+              <a:chExt cx="649224" cy="671331"/>
+            </a:xfrm>
+          </p:grpSpPr>
+          <p:cxnSp>
+            <p:nvCxnSpPr>
+              <p:cNvPr id="76" name="Straight Connector 75">
+                <a:extLst>
+                  <a:ext uri="{FF2B5EF4-FFF2-40B4-BE49-F238E27FC236}">
+                    <a16:creationId xmlns:a16="http://schemas.microsoft.com/office/drawing/2014/main" id="{7E4CC14B-2E1F-4408-A898-2C840342735A}"/>
+                  </a:ext>
+                </a:extLst>
+              </p:cNvPr>
+              <p:cNvCxnSpPr>
+                <a:cxnSpLocks/>
+              </p:cNvCxnSpPr>
+              <p:nvPr/>
+            </p:nvCxnSpPr>
+            <p:spPr>
+              <a:xfrm>
+                <a:off x="5713837" y="3767509"/>
+                <a:ext cx="649224" cy="0"/>
+              </a:xfrm>
+              <a:prstGeom prst="line">
+                <a:avLst/>
+              </a:prstGeom>
+              <a:ln w="19050">
+                <a:solidFill>
+                  <a:schemeClr val="tx1"/>
+                </a:solidFill>
+              </a:ln>
+            </p:spPr>
+            <p:style>
+              <a:lnRef idx="1">
+                <a:schemeClr val="accent1"/>
+              </a:lnRef>
+              <a:fillRef idx="0">
+                <a:schemeClr val="accent1"/>
+              </a:fillRef>
+              <a:effectRef idx="0">
+                <a:schemeClr val="accent1"/>
+              </a:effectRef>
+              <a:fontRef idx="minor">
+                <a:schemeClr val="tx1"/>
+              </a:fontRef>
+            </p:style>
+          </p:cxnSp>
+          <p:cxnSp>
+            <p:nvCxnSpPr>
+              <p:cNvPr id="77" name="Straight Connector 76">
+                <a:extLst>
+                  <a:ext uri="{FF2B5EF4-FFF2-40B4-BE49-F238E27FC236}">
+                    <a16:creationId xmlns:a16="http://schemas.microsoft.com/office/drawing/2014/main" id="{07CB03A4-0092-4B68-920A-4C7E4721CA12}"/>
+                  </a:ext>
+                </a:extLst>
+              </p:cNvPr>
+              <p:cNvCxnSpPr>
+                <a:cxnSpLocks/>
+              </p:cNvCxnSpPr>
+              <p:nvPr/>
+            </p:nvCxnSpPr>
+            <p:spPr>
+              <a:xfrm>
+                <a:off x="5713837" y="3991286"/>
+                <a:ext cx="649224" cy="0"/>
+              </a:xfrm>
+              <a:prstGeom prst="line">
+                <a:avLst/>
+              </a:prstGeom>
+              <a:ln w="19050">
+                <a:solidFill>
+                  <a:schemeClr val="tx1"/>
+                </a:solidFill>
+              </a:ln>
+            </p:spPr>
+            <p:style>
+              <a:lnRef idx="1">
+                <a:schemeClr val="accent1"/>
+              </a:lnRef>
+              <a:fillRef idx="0">
+                <a:schemeClr val="accent1"/>
+              </a:fillRef>
+              <a:effectRef idx="0">
+                <a:schemeClr val="accent1"/>
+              </a:effectRef>
+              <a:fontRef idx="minor">
+                <a:schemeClr val="tx1"/>
+              </a:fontRef>
+            </p:style>
+          </p:cxnSp>
+          <p:cxnSp>
+            <p:nvCxnSpPr>
+              <p:cNvPr id="78" name="Straight Connector 77">
+                <a:extLst>
+                  <a:ext uri="{FF2B5EF4-FFF2-40B4-BE49-F238E27FC236}">
+                    <a16:creationId xmlns:a16="http://schemas.microsoft.com/office/drawing/2014/main" id="{FFF80FD0-A296-4A7B-A8CD-B740715EF52A}"/>
+                  </a:ext>
+                </a:extLst>
+              </p:cNvPr>
+              <p:cNvCxnSpPr>
+                <a:cxnSpLocks/>
+              </p:cNvCxnSpPr>
+              <p:nvPr/>
+            </p:nvCxnSpPr>
+            <p:spPr>
+              <a:xfrm>
+                <a:off x="5713837" y="4215063"/>
+                <a:ext cx="649224" cy="0"/>
+              </a:xfrm>
+              <a:prstGeom prst="line">
+                <a:avLst/>
+              </a:prstGeom>
+              <a:ln w="19050">
+                <a:solidFill>
+                  <a:schemeClr val="tx1"/>
+                </a:solidFill>
+              </a:ln>
+            </p:spPr>
+            <p:style>
+              <a:lnRef idx="1">
+                <a:schemeClr val="accent1"/>
+              </a:lnRef>
+              <a:fillRef idx="0">
+                <a:schemeClr val="accent1"/>
+              </a:fillRef>
+              <a:effectRef idx="0">
+                <a:schemeClr val="accent1"/>
+              </a:effectRef>
+              <a:fontRef idx="minor">
+                <a:schemeClr val="tx1"/>
+              </a:fontRef>
+            </p:style>
+          </p:cxnSp>
+          <p:cxnSp>
+            <p:nvCxnSpPr>
+              <p:cNvPr id="79" name="Straight Connector 78">
+                <a:extLst>
+                  <a:ext uri="{FF2B5EF4-FFF2-40B4-BE49-F238E27FC236}">
+                    <a16:creationId xmlns:a16="http://schemas.microsoft.com/office/drawing/2014/main" id="{9B79F909-39F1-4C13-913E-6DFB0BAB8862}"/>
+                  </a:ext>
+                </a:extLst>
+              </p:cNvPr>
+              <p:cNvCxnSpPr>
+                <a:cxnSpLocks/>
+              </p:cNvCxnSpPr>
+              <p:nvPr/>
+            </p:nvCxnSpPr>
+            <p:spPr>
+              <a:xfrm>
+                <a:off x="5713837" y="4438840"/>
+                <a:ext cx="649224" cy="0"/>
+              </a:xfrm>
+              <a:prstGeom prst="line">
+                <a:avLst/>
+              </a:prstGeom>
+              <a:ln w="19050">
+                <a:solidFill>
+                  <a:schemeClr val="tx1"/>
+                </a:solidFill>
+              </a:ln>
+            </p:spPr>
+            <p:style>
+              <a:lnRef idx="1">
+                <a:schemeClr val="accent1"/>
+              </a:lnRef>
+              <a:fillRef idx="0">
+                <a:schemeClr val="accent1"/>
+              </a:fillRef>
+              <a:effectRef idx="0">
+                <a:schemeClr val="accent1"/>
+              </a:effectRef>
+              <a:fontRef idx="minor">
+                <a:schemeClr val="tx1"/>
+              </a:fontRef>
+            </p:style>
+          </p:cxnSp>
+        </p:grpSp>
+        <p:grpSp>
+          <p:nvGrpSpPr>
+            <p:cNvPr id="70" name="Group 69">
+              <a:extLst>
+                <a:ext uri="{FF2B5EF4-FFF2-40B4-BE49-F238E27FC236}">
+                  <a16:creationId xmlns:a16="http://schemas.microsoft.com/office/drawing/2014/main" id="{F3893DC4-A7DE-48DF-A6EF-D431AF882877}"/>
+                </a:ext>
+              </a:extLst>
+            </p:cNvPr>
+            <p:cNvGrpSpPr/>
+            <p:nvPr/>
+          </p:nvGrpSpPr>
+          <p:grpSpPr>
+            <a:xfrm>
+              <a:off x="6815795" y="1039626"/>
+              <a:ext cx="201990" cy="671331"/>
+              <a:chOff x="5713837" y="3767509"/>
+              <a:chExt cx="649224" cy="671331"/>
+            </a:xfrm>
+          </p:grpSpPr>
+          <p:cxnSp>
+            <p:nvCxnSpPr>
+              <p:cNvPr id="72" name="Straight Connector 71">
+                <a:extLst>
+                  <a:ext uri="{FF2B5EF4-FFF2-40B4-BE49-F238E27FC236}">
+                    <a16:creationId xmlns:a16="http://schemas.microsoft.com/office/drawing/2014/main" id="{815F0450-0492-47F9-83D0-3C74CDEA4D2C}"/>
+                  </a:ext>
+                </a:extLst>
+              </p:cNvPr>
+              <p:cNvCxnSpPr>
+                <a:cxnSpLocks/>
+              </p:cNvCxnSpPr>
+              <p:nvPr/>
+            </p:nvCxnSpPr>
+            <p:spPr>
+              <a:xfrm>
+                <a:off x="5713837" y="3767509"/>
+                <a:ext cx="649224" cy="0"/>
+              </a:xfrm>
+              <a:prstGeom prst="line">
+                <a:avLst/>
+              </a:prstGeom>
+              <a:ln w="19050">
+                <a:solidFill>
+                  <a:schemeClr val="tx1"/>
+                </a:solidFill>
+              </a:ln>
+            </p:spPr>
+            <p:style>
+              <a:lnRef idx="1">
+                <a:schemeClr val="accent1"/>
+              </a:lnRef>
+              <a:fillRef idx="0">
+                <a:schemeClr val="accent1"/>
+              </a:fillRef>
+              <a:effectRef idx="0">
+                <a:schemeClr val="accent1"/>
+              </a:effectRef>
+              <a:fontRef idx="minor">
+                <a:schemeClr val="tx1"/>
+              </a:fontRef>
+            </p:style>
+          </p:cxnSp>
+          <p:cxnSp>
+            <p:nvCxnSpPr>
+              <p:cNvPr id="73" name="Straight Connector 72">
+                <a:extLst>
+                  <a:ext uri="{FF2B5EF4-FFF2-40B4-BE49-F238E27FC236}">
+                    <a16:creationId xmlns:a16="http://schemas.microsoft.com/office/drawing/2014/main" id="{0F9ABDD8-D1C1-4B0A-BAA4-69475068AB6C}"/>
+                  </a:ext>
+                </a:extLst>
+              </p:cNvPr>
+              <p:cNvCxnSpPr>
+                <a:cxnSpLocks/>
+              </p:cNvCxnSpPr>
+              <p:nvPr/>
+            </p:nvCxnSpPr>
+            <p:spPr>
+              <a:xfrm>
+                <a:off x="5713837" y="3991286"/>
+                <a:ext cx="649224" cy="0"/>
+              </a:xfrm>
+              <a:prstGeom prst="line">
+                <a:avLst/>
+              </a:prstGeom>
+              <a:ln w="19050">
+                <a:solidFill>
+                  <a:schemeClr val="tx1"/>
+                </a:solidFill>
+              </a:ln>
+            </p:spPr>
+            <p:style>
+              <a:lnRef idx="1">
+                <a:schemeClr val="accent1"/>
+              </a:lnRef>
+              <a:fillRef idx="0">
+                <a:schemeClr val="accent1"/>
+              </a:fillRef>
+              <a:effectRef idx="0">
+                <a:schemeClr val="accent1"/>
+              </a:effectRef>
+              <a:fontRef idx="minor">
+                <a:schemeClr val="tx1"/>
+              </a:fontRef>
+            </p:style>
+          </p:cxnSp>
+          <p:cxnSp>
+            <p:nvCxnSpPr>
+              <p:cNvPr id="74" name="Straight Connector 73">
+                <a:extLst>
+                  <a:ext uri="{FF2B5EF4-FFF2-40B4-BE49-F238E27FC236}">
+                    <a16:creationId xmlns:a16="http://schemas.microsoft.com/office/drawing/2014/main" id="{2DE418FF-D22E-465A-AB49-8B5EC9C0262E}"/>
+                  </a:ext>
+                </a:extLst>
+              </p:cNvPr>
+              <p:cNvCxnSpPr>
+                <a:cxnSpLocks/>
+              </p:cNvCxnSpPr>
+              <p:nvPr/>
+            </p:nvCxnSpPr>
+            <p:spPr>
+              <a:xfrm>
+                <a:off x="5713837" y="4215063"/>
+                <a:ext cx="649224" cy="0"/>
+              </a:xfrm>
+              <a:prstGeom prst="line">
+                <a:avLst/>
+              </a:prstGeom>
+              <a:ln w="19050">
+                <a:solidFill>
+                  <a:schemeClr val="tx1"/>
+                </a:solidFill>
+              </a:ln>
+            </p:spPr>
+            <p:style>
+              <a:lnRef idx="1">
+                <a:schemeClr val="accent1"/>
+              </a:lnRef>
+              <a:fillRef idx="0">
+                <a:schemeClr val="accent1"/>
+              </a:fillRef>
+              <a:effectRef idx="0">
+                <a:schemeClr val="accent1"/>
+              </a:effectRef>
+              <a:fontRef idx="minor">
+                <a:schemeClr val="tx1"/>
+              </a:fontRef>
+            </p:style>
+          </p:cxnSp>
+          <p:cxnSp>
+            <p:nvCxnSpPr>
+              <p:cNvPr id="75" name="Straight Connector 74">
+                <a:extLst>
+                  <a:ext uri="{FF2B5EF4-FFF2-40B4-BE49-F238E27FC236}">
+                    <a16:creationId xmlns:a16="http://schemas.microsoft.com/office/drawing/2014/main" id="{9EC8B455-EC84-4698-8499-F1C1D83EDC2E}"/>
+                  </a:ext>
+                </a:extLst>
+              </p:cNvPr>
+              <p:cNvCxnSpPr>
+                <a:cxnSpLocks/>
+              </p:cNvCxnSpPr>
+              <p:nvPr/>
+            </p:nvCxnSpPr>
+            <p:spPr>
+              <a:xfrm>
+                <a:off x="5713837" y="4438840"/>
+                <a:ext cx="649224" cy="0"/>
+              </a:xfrm>
+              <a:prstGeom prst="line">
+                <a:avLst/>
+              </a:prstGeom>
+              <a:ln w="19050">
+                <a:solidFill>
+                  <a:schemeClr val="tx1"/>
+                </a:solidFill>
+              </a:ln>
+            </p:spPr>
+            <p:style>
+              <a:lnRef idx="1">
+                <a:schemeClr val="accent1"/>
+              </a:lnRef>
+              <a:fillRef idx="0">
+                <a:schemeClr val="accent1"/>
+              </a:fillRef>
+              <a:effectRef idx="0">
+                <a:schemeClr val="accent1"/>
+              </a:effectRef>
+              <a:fontRef idx="minor">
+                <a:schemeClr val="tx1"/>
+              </a:fontRef>
+            </p:style>
+          </p:cxnSp>
+        </p:grpSp>
+        <p:sp>
+          <p:nvSpPr>
+            <p:cNvPr id="71" name="TextBox 70">
+              <a:extLst>
+                <a:ext uri="{FF2B5EF4-FFF2-40B4-BE49-F238E27FC236}">
+                  <a16:creationId xmlns:a16="http://schemas.microsoft.com/office/drawing/2014/main" id="{AA0FF791-15FB-482D-B501-7D2774EF4626}"/>
+                </a:ext>
+              </a:extLst>
+            </p:cNvPr>
+            <p:cNvSpPr txBox="1"/>
+            <p:nvPr/>
+          </p:nvSpPr>
+          <p:spPr>
+            <a:xfrm rot="16200000">
+              <a:off x="6032058" y="1201250"/>
+              <a:ext cx="1071127" cy="369332"/>
+            </a:xfrm>
+            <a:prstGeom prst="rect">
+              <a:avLst/>
+            </a:prstGeom>
+            <a:noFill/>
+          </p:spPr>
+          <p:txBody>
+            <a:bodyPr wrap="none" rtlCol="0">
+              <a:spAutoFit/>
+            </a:bodyPr>
+            <a:lstStyle/>
+            <a:p>
+              <a:r>
+                <a:rPr lang="en-US">
+                  <a:solidFill>
+                    <a:schemeClr val="bg1"/>
+                  </a:solidFill>
+                  <a:latin typeface="Anonymous Pro" panose="02060609030202000504" pitchFamily="49" charset="0"/>
+                  <a:ea typeface="Anonymous Pro" panose="02060609030202000504" pitchFamily="49" charset="0"/>
+                </a:rPr>
+                <a:t>74LS196</a:t>
+              </a:r>
+            </a:p>
+          </p:txBody>
+        </p:sp>
+      </p:grpSp>
+      <p:sp>
+        <p:nvSpPr>
+          <p:cNvPr id="80" name="TextBox 79">
+            <a:extLst>
+              <a:ext uri="{FF2B5EF4-FFF2-40B4-BE49-F238E27FC236}">
+                <a16:creationId xmlns:a16="http://schemas.microsoft.com/office/drawing/2014/main" id="{7441A769-9DDB-4623-8B5D-DB722D7FF3CB}"/>
+              </a:ext>
+            </a:extLst>
+          </p:cNvPr>
+          <p:cNvSpPr txBox="1"/>
+          <p:nvPr/>
+        </p:nvSpPr>
+        <p:spPr>
+          <a:xfrm>
+            <a:off x="7283086" y="2286453"/>
+            <a:ext cx="457176" cy="369332"/>
+          </a:xfrm>
+          <a:prstGeom prst="rect">
+            <a:avLst/>
+          </a:prstGeom>
+          <a:noFill/>
+        </p:spPr>
+        <p:txBody>
+          <a:bodyPr wrap="none" rtlCol="0">
+            <a:spAutoFit/>
+          </a:bodyPr>
+          <a:lstStyle/>
+          <a:p>
+            <a:r>
+              <a:rPr lang="en-US">
+                <a:latin typeface="Anonymous Pro" panose="02060609030202000504" pitchFamily="49" charset="0"/>
+                <a:ea typeface="Anonymous Pro" panose="02060609030202000504" pitchFamily="49" charset="0"/>
+              </a:rPr>
+              <a:t>Q0</a:t>
+            </a:r>
+          </a:p>
+        </p:txBody>
+      </p:sp>
+      <p:sp>
+        <p:nvSpPr>
+          <p:cNvPr id="81" name="TextBox 80">
+            <a:extLst>
+              <a:ext uri="{FF2B5EF4-FFF2-40B4-BE49-F238E27FC236}">
+                <a16:creationId xmlns:a16="http://schemas.microsoft.com/office/drawing/2014/main" id="{29F149D9-213F-40EA-8C6B-25E89C622439}"/>
+              </a:ext>
+            </a:extLst>
+          </p:cNvPr>
+          <p:cNvSpPr txBox="1"/>
+          <p:nvPr/>
+        </p:nvSpPr>
+        <p:spPr>
+          <a:xfrm>
+            <a:off x="7283086" y="2509471"/>
+            <a:ext cx="311304" cy="369332"/>
+          </a:xfrm>
+          <a:prstGeom prst="rect">
+            <a:avLst/>
+          </a:prstGeom>
+          <a:noFill/>
+        </p:spPr>
+        <p:txBody>
+          <a:bodyPr wrap="none" rtlCol="0">
+            <a:spAutoFit/>
+          </a:bodyPr>
+          <a:lstStyle/>
+          <a:p>
+            <a:r>
+              <a:rPr lang="en-US">
+                <a:latin typeface="Anonymous Pro" panose="02060609030202000504" pitchFamily="49" charset="0"/>
+                <a:ea typeface="Anonymous Pro" panose="02060609030202000504" pitchFamily="49" charset="0"/>
+              </a:rPr>
+              <a:t>Q1</a:t>
+            </a:r>
+          </a:p>
+        </p:txBody>
+      </p:sp>
+      <p:sp>
+        <p:nvSpPr>
+          <p:cNvPr id="82" name="TextBox 81">
+            <a:extLst>
+              <a:ext uri="{FF2B5EF4-FFF2-40B4-BE49-F238E27FC236}">
+                <a16:creationId xmlns:a16="http://schemas.microsoft.com/office/drawing/2014/main" id="{A94C75DC-ECF6-4747-ADE9-428793047D9A}"/>
+              </a:ext>
+            </a:extLst>
+          </p:cNvPr>
+          <p:cNvSpPr txBox="1"/>
+          <p:nvPr/>
+        </p:nvSpPr>
+        <p:spPr>
+          <a:xfrm>
+            <a:off x="7283086" y="2732489"/>
+            <a:ext cx="311304" cy="369332"/>
+          </a:xfrm>
+          <a:prstGeom prst="rect">
+            <a:avLst/>
+          </a:prstGeom>
+          <a:noFill/>
+        </p:spPr>
+        <p:txBody>
+          <a:bodyPr wrap="none" rtlCol="0">
+            <a:spAutoFit/>
+          </a:bodyPr>
+          <a:lstStyle/>
+          <a:p>
+            <a:r>
+              <a:rPr lang="en-US">
+                <a:latin typeface="Anonymous Pro" panose="02060609030202000504" pitchFamily="49" charset="0"/>
+                <a:ea typeface="Anonymous Pro" panose="02060609030202000504" pitchFamily="49" charset="0"/>
+              </a:rPr>
+              <a:t>Q2</a:t>
+            </a:r>
+          </a:p>
+        </p:txBody>
+      </p:sp>
+      <p:sp>
+        <p:nvSpPr>
+          <p:cNvPr id="83" name="TextBox 82">
+            <a:extLst>
+              <a:ext uri="{FF2B5EF4-FFF2-40B4-BE49-F238E27FC236}">
+                <a16:creationId xmlns:a16="http://schemas.microsoft.com/office/drawing/2014/main" id="{FBFDB957-D13A-4CE9-8BA0-21A99CDA9C12}"/>
+              </a:ext>
+            </a:extLst>
+          </p:cNvPr>
+          <p:cNvSpPr txBox="1"/>
+          <p:nvPr/>
+        </p:nvSpPr>
+        <p:spPr>
+          <a:xfrm>
+            <a:off x="7283086" y="2955507"/>
+            <a:ext cx="311304" cy="369332"/>
+          </a:xfrm>
+          <a:prstGeom prst="rect">
+            <a:avLst/>
+          </a:prstGeom>
+          <a:noFill/>
+        </p:spPr>
+        <p:txBody>
+          <a:bodyPr wrap="none" rtlCol="0">
+            <a:spAutoFit/>
+          </a:bodyPr>
+          <a:lstStyle/>
+          <a:p>
+            <a:r>
+              <a:rPr lang="en-US">
+                <a:latin typeface="Anonymous Pro" panose="02060609030202000504" pitchFamily="49" charset="0"/>
+                <a:ea typeface="Anonymous Pro" panose="02060609030202000504" pitchFamily="49" charset="0"/>
+              </a:rPr>
+              <a:t>Q3</a:t>
+            </a:r>
+          </a:p>
+        </p:txBody>
+      </p:sp>
+      <p:sp>
+        <p:nvSpPr>
+          <p:cNvPr id="84" name="TextBox 83">
+            <a:extLst>
+              <a:ext uri="{FF2B5EF4-FFF2-40B4-BE49-F238E27FC236}">
+                <a16:creationId xmlns:a16="http://schemas.microsoft.com/office/drawing/2014/main" id="{B2334764-C4A6-4596-8C81-1525AB80CECE}"/>
+              </a:ext>
+            </a:extLst>
+          </p:cNvPr>
+          <p:cNvSpPr txBox="1"/>
+          <p:nvPr/>
+        </p:nvSpPr>
+        <p:spPr>
+          <a:xfrm>
+            <a:off x="7283086" y="3178525"/>
+            <a:ext cx="564578" cy="369332"/>
+          </a:xfrm>
+          <a:prstGeom prst="rect">
+            <a:avLst/>
+          </a:prstGeom>
+          <a:noFill/>
+        </p:spPr>
+        <p:txBody>
+          <a:bodyPr wrap="none" rtlCol="0">
+            <a:spAutoFit/>
+          </a:bodyPr>
+          <a:lstStyle/>
+          <a:p>
+            <a:r>
+              <a:rPr lang="en-US">
+                <a:latin typeface="Anonymous Pro" panose="02060609030202000504" pitchFamily="49" charset="0"/>
+                <a:ea typeface="Anonymous Pro" panose="02060609030202000504" pitchFamily="49" charset="0"/>
+              </a:rPr>
+              <a:t>Q4</a:t>
+            </a:r>
+          </a:p>
+        </p:txBody>
+      </p:sp>
+      <p:sp>
+        <p:nvSpPr>
+          <p:cNvPr id="85" name="TextBox 84">
+            <a:extLst>
+              <a:ext uri="{FF2B5EF4-FFF2-40B4-BE49-F238E27FC236}">
+                <a16:creationId xmlns:a16="http://schemas.microsoft.com/office/drawing/2014/main" id="{DD7C0438-3425-471F-A2ED-D128F879A476}"/>
+              </a:ext>
+            </a:extLst>
+          </p:cNvPr>
+          <p:cNvSpPr txBox="1"/>
+          <p:nvPr/>
+        </p:nvSpPr>
+        <p:spPr>
+          <a:xfrm>
+            <a:off x="7283086" y="3401543"/>
+            <a:ext cx="311304" cy="369332"/>
+          </a:xfrm>
+          <a:prstGeom prst="rect">
+            <a:avLst/>
+          </a:prstGeom>
+          <a:noFill/>
+        </p:spPr>
+        <p:txBody>
+          <a:bodyPr wrap="none" rtlCol="0">
+            <a:spAutoFit/>
+          </a:bodyPr>
+          <a:lstStyle/>
+          <a:p>
+            <a:r>
+              <a:rPr lang="en-US">
+                <a:latin typeface="Anonymous Pro" panose="02060609030202000504" pitchFamily="49" charset="0"/>
+                <a:ea typeface="Anonymous Pro" panose="02060609030202000504" pitchFamily="49" charset="0"/>
+              </a:rPr>
+              <a:t>Q5</a:t>
+            </a:r>
+          </a:p>
+        </p:txBody>
+      </p:sp>
+      <p:sp>
+        <p:nvSpPr>
+          <p:cNvPr id="86" name="TextBox 85">
+            <a:extLst>
+              <a:ext uri="{FF2B5EF4-FFF2-40B4-BE49-F238E27FC236}">
+                <a16:creationId xmlns:a16="http://schemas.microsoft.com/office/drawing/2014/main" id="{33F6DB06-5EEF-4C01-9B86-CC92029204D6}"/>
+              </a:ext>
+            </a:extLst>
+          </p:cNvPr>
+          <p:cNvSpPr txBox="1"/>
+          <p:nvPr/>
+        </p:nvSpPr>
+        <p:spPr>
+          <a:xfrm>
+            <a:off x="7283086" y="3624561"/>
+            <a:ext cx="311304" cy="369332"/>
+          </a:xfrm>
+          <a:prstGeom prst="rect">
+            <a:avLst/>
+          </a:prstGeom>
+          <a:noFill/>
+        </p:spPr>
+        <p:txBody>
+          <a:bodyPr wrap="none" rtlCol="0">
+            <a:spAutoFit/>
+          </a:bodyPr>
+          <a:lstStyle/>
+          <a:p>
+            <a:r>
+              <a:rPr lang="en-US">
+                <a:latin typeface="Anonymous Pro" panose="02060609030202000504" pitchFamily="49" charset="0"/>
+                <a:ea typeface="Anonymous Pro" panose="02060609030202000504" pitchFamily="49" charset="0"/>
+              </a:rPr>
+              <a:t>Q6</a:t>
+            </a:r>
+          </a:p>
+        </p:txBody>
+      </p:sp>
+      <p:sp>
+        <p:nvSpPr>
+          <p:cNvPr id="87" name="TextBox 86">
+            <a:extLst>
+              <a:ext uri="{FF2B5EF4-FFF2-40B4-BE49-F238E27FC236}">
+                <a16:creationId xmlns:a16="http://schemas.microsoft.com/office/drawing/2014/main" id="{4DBA8EB8-CCEA-4408-95EC-DAEA6D4CFA7F}"/>
+              </a:ext>
+            </a:extLst>
+          </p:cNvPr>
+          <p:cNvSpPr txBox="1"/>
+          <p:nvPr/>
+        </p:nvSpPr>
+        <p:spPr>
+          <a:xfrm>
+            <a:off x="7283086" y="3847582"/>
+            <a:ext cx="311304" cy="369332"/>
+          </a:xfrm>
+          <a:prstGeom prst="rect">
+            <a:avLst/>
+          </a:prstGeom>
+          <a:noFill/>
+        </p:spPr>
+        <p:txBody>
+          <a:bodyPr wrap="none" rtlCol="0">
+            <a:spAutoFit/>
+          </a:bodyPr>
+          <a:lstStyle/>
+          <a:p>
+            <a:r>
+              <a:rPr lang="en-US">
+                <a:latin typeface="Anonymous Pro" panose="02060609030202000504" pitchFamily="49" charset="0"/>
+                <a:ea typeface="Anonymous Pro" panose="02060609030202000504" pitchFamily="49" charset="0"/>
+              </a:rPr>
+              <a:t>Q7</a:t>
+            </a:r>
+          </a:p>
+        </p:txBody>
+      </p:sp>
+      <p:sp>
+        <p:nvSpPr>
+          <p:cNvPr id="88" name="TextBox 87">
+            <a:extLst>
+              <a:ext uri="{FF2B5EF4-FFF2-40B4-BE49-F238E27FC236}">
+                <a16:creationId xmlns:a16="http://schemas.microsoft.com/office/drawing/2014/main" id="{4C33EF52-99C0-4B4D-ABCB-839F1936F6FA}"/>
+              </a:ext>
+            </a:extLst>
+          </p:cNvPr>
+          <p:cNvSpPr txBox="1"/>
+          <p:nvPr/>
+        </p:nvSpPr>
+        <p:spPr>
+          <a:xfrm>
+            <a:off x="4169537" y="1949699"/>
+            <a:ext cx="457200" cy="369332"/>
+          </a:xfrm>
+          <a:prstGeom prst="rect">
+            <a:avLst/>
+          </a:prstGeom>
+          <a:noFill/>
+        </p:spPr>
+        <p:txBody>
+          <a:bodyPr wrap="square" rtlCol="0">
+            <a:spAutoFit/>
+          </a:bodyPr>
+          <a:lstStyle/>
+          <a:p>
+            <a:pPr algn="r"/>
+            <a:r>
+              <a:rPr lang="en-US">
+                <a:latin typeface="Anonymous Pro" panose="02060609030202000504" pitchFamily="49" charset="0"/>
+                <a:ea typeface="Anonymous Pro" panose="02060609030202000504" pitchFamily="49" charset="0"/>
+              </a:rPr>
+              <a:t>D0</a:t>
+            </a:r>
+          </a:p>
+        </p:txBody>
+      </p:sp>
+      <p:sp>
+        <p:nvSpPr>
+          <p:cNvPr id="89" name="TextBox 88">
+            <a:extLst>
+              <a:ext uri="{FF2B5EF4-FFF2-40B4-BE49-F238E27FC236}">
+                <a16:creationId xmlns:a16="http://schemas.microsoft.com/office/drawing/2014/main" id="{260337BB-22F8-400E-A2C1-5F1C90F1FC9A}"/>
+              </a:ext>
+            </a:extLst>
+          </p:cNvPr>
+          <p:cNvSpPr txBox="1"/>
+          <p:nvPr/>
+        </p:nvSpPr>
+        <p:spPr>
+          <a:xfrm>
+            <a:off x="4188797" y="2172717"/>
+            <a:ext cx="437940" cy="369332"/>
+          </a:xfrm>
+          <a:prstGeom prst="rect">
+            <a:avLst/>
+          </a:prstGeom>
+          <a:noFill/>
+        </p:spPr>
+        <p:txBody>
+          <a:bodyPr wrap="none" rtlCol="0">
+            <a:spAutoFit/>
+          </a:bodyPr>
+          <a:lstStyle/>
+          <a:p>
+            <a:pPr algn="r"/>
+            <a:r>
+              <a:rPr lang="en-US">
+                <a:latin typeface="Anonymous Pro" panose="02060609030202000504" pitchFamily="49" charset="0"/>
+                <a:ea typeface="Anonymous Pro" panose="02060609030202000504" pitchFamily="49" charset="0"/>
+              </a:rPr>
+              <a:t>D1</a:t>
+            </a:r>
+          </a:p>
+        </p:txBody>
+      </p:sp>
+      <p:sp>
+        <p:nvSpPr>
+          <p:cNvPr id="90" name="TextBox 89">
+            <a:extLst>
+              <a:ext uri="{FF2B5EF4-FFF2-40B4-BE49-F238E27FC236}">
+                <a16:creationId xmlns:a16="http://schemas.microsoft.com/office/drawing/2014/main" id="{0B652E00-6A5B-454D-AB70-23E01A83E232}"/>
+              </a:ext>
+            </a:extLst>
+          </p:cNvPr>
+          <p:cNvSpPr txBox="1"/>
+          <p:nvPr/>
+        </p:nvSpPr>
+        <p:spPr>
+          <a:xfrm>
+            <a:off x="4188797" y="2395735"/>
+            <a:ext cx="437940" cy="369332"/>
+          </a:xfrm>
+          <a:prstGeom prst="rect">
+            <a:avLst/>
+          </a:prstGeom>
+          <a:noFill/>
+        </p:spPr>
+        <p:txBody>
+          <a:bodyPr wrap="square" rtlCol="0">
+            <a:spAutoFit/>
+          </a:bodyPr>
+          <a:lstStyle/>
+          <a:p>
+            <a:pPr algn="r"/>
+            <a:r>
+              <a:rPr lang="en-US">
+                <a:latin typeface="Anonymous Pro" panose="02060609030202000504" pitchFamily="49" charset="0"/>
+                <a:ea typeface="Anonymous Pro" panose="02060609030202000504" pitchFamily="49" charset="0"/>
+              </a:rPr>
+              <a:t>D2</a:t>
+            </a:r>
+          </a:p>
+        </p:txBody>
+      </p:sp>
+      <p:sp>
+        <p:nvSpPr>
+          <p:cNvPr id="91" name="TextBox 90">
+            <a:extLst>
+              <a:ext uri="{FF2B5EF4-FFF2-40B4-BE49-F238E27FC236}">
+                <a16:creationId xmlns:a16="http://schemas.microsoft.com/office/drawing/2014/main" id="{67347DEF-152D-4348-A6BC-C0BE639C3D69}"/>
+              </a:ext>
+            </a:extLst>
+          </p:cNvPr>
+          <p:cNvSpPr txBox="1"/>
+          <p:nvPr/>
+        </p:nvSpPr>
+        <p:spPr>
+          <a:xfrm>
+            <a:off x="4188797" y="2618753"/>
+            <a:ext cx="437940" cy="369332"/>
+          </a:xfrm>
+          <a:prstGeom prst="rect">
+            <a:avLst/>
+          </a:prstGeom>
+          <a:noFill/>
+        </p:spPr>
+        <p:txBody>
+          <a:bodyPr wrap="none" rtlCol="0">
+            <a:spAutoFit/>
+          </a:bodyPr>
+          <a:lstStyle/>
+          <a:p>
+            <a:pPr algn="r"/>
+            <a:r>
+              <a:rPr lang="en-US">
+                <a:latin typeface="Anonymous Pro" panose="02060609030202000504" pitchFamily="49" charset="0"/>
+                <a:ea typeface="Anonymous Pro" panose="02060609030202000504" pitchFamily="49" charset="0"/>
+              </a:rPr>
+              <a:t>D3</a:t>
+            </a:r>
+          </a:p>
+        </p:txBody>
+      </p:sp>
+      <p:sp>
+        <p:nvSpPr>
+          <p:cNvPr id="92" name="TextBox 91">
+            <a:extLst>
+              <a:ext uri="{FF2B5EF4-FFF2-40B4-BE49-F238E27FC236}">
+                <a16:creationId xmlns:a16="http://schemas.microsoft.com/office/drawing/2014/main" id="{2626F15D-FAF0-4C17-AB15-9B16382713EE}"/>
+              </a:ext>
+            </a:extLst>
+          </p:cNvPr>
+          <p:cNvSpPr txBox="1"/>
+          <p:nvPr/>
+        </p:nvSpPr>
+        <p:spPr>
+          <a:xfrm>
+            <a:off x="4188797" y="2841771"/>
+            <a:ext cx="437940" cy="369332"/>
+          </a:xfrm>
+          <a:prstGeom prst="rect">
+            <a:avLst/>
+          </a:prstGeom>
+          <a:noFill/>
+        </p:spPr>
+        <p:txBody>
+          <a:bodyPr wrap="none" rtlCol="0">
+            <a:spAutoFit/>
+          </a:bodyPr>
+          <a:lstStyle/>
+          <a:p>
+            <a:pPr algn="r"/>
+            <a:r>
+              <a:rPr lang="en-US">
+                <a:latin typeface="Anonymous Pro" panose="02060609030202000504" pitchFamily="49" charset="0"/>
+                <a:ea typeface="Anonymous Pro" panose="02060609030202000504" pitchFamily="49" charset="0"/>
+              </a:rPr>
+              <a:t>D4</a:t>
+            </a:r>
+          </a:p>
+        </p:txBody>
+      </p:sp>
+      <p:sp>
+        <p:nvSpPr>
+          <p:cNvPr id="93" name="TextBox 92">
+            <a:extLst>
+              <a:ext uri="{FF2B5EF4-FFF2-40B4-BE49-F238E27FC236}">
+                <a16:creationId xmlns:a16="http://schemas.microsoft.com/office/drawing/2014/main" id="{CB3F32BD-31B8-45D5-A349-99673DE20AC1}"/>
+              </a:ext>
+            </a:extLst>
+          </p:cNvPr>
+          <p:cNvSpPr txBox="1"/>
+          <p:nvPr/>
+        </p:nvSpPr>
+        <p:spPr>
+          <a:xfrm>
+            <a:off x="4188797" y="3064789"/>
+            <a:ext cx="437940" cy="369332"/>
+          </a:xfrm>
+          <a:prstGeom prst="rect">
+            <a:avLst/>
+          </a:prstGeom>
+          <a:noFill/>
+        </p:spPr>
+        <p:txBody>
+          <a:bodyPr wrap="none" rtlCol="0">
+            <a:spAutoFit/>
+          </a:bodyPr>
+          <a:lstStyle/>
+          <a:p>
+            <a:pPr algn="r"/>
+            <a:r>
+              <a:rPr lang="en-US">
+                <a:latin typeface="Anonymous Pro" panose="02060609030202000504" pitchFamily="49" charset="0"/>
+                <a:ea typeface="Anonymous Pro" panose="02060609030202000504" pitchFamily="49" charset="0"/>
+              </a:rPr>
+              <a:t>D5</a:t>
+            </a:r>
+          </a:p>
+        </p:txBody>
+      </p:sp>
+      <p:sp>
+        <p:nvSpPr>
+          <p:cNvPr id="94" name="TextBox 93">
+            <a:extLst>
+              <a:ext uri="{FF2B5EF4-FFF2-40B4-BE49-F238E27FC236}">
+                <a16:creationId xmlns:a16="http://schemas.microsoft.com/office/drawing/2014/main" id="{7AA560C1-4CAB-448C-B57C-0E491F1DF96A}"/>
+              </a:ext>
+            </a:extLst>
+          </p:cNvPr>
+          <p:cNvSpPr txBox="1"/>
+          <p:nvPr/>
+        </p:nvSpPr>
+        <p:spPr>
+          <a:xfrm>
+            <a:off x="4188797" y="3287807"/>
+            <a:ext cx="437940" cy="369332"/>
+          </a:xfrm>
+          <a:prstGeom prst="rect">
+            <a:avLst/>
+          </a:prstGeom>
+          <a:noFill/>
+        </p:spPr>
+        <p:txBody>
+          <a:bodyPr wrap="none" rtlCol="0">
+            <a:spAutoFit/>
+          </a:bodyPr>
+          <a:lstStyle/>
+          <a:p>
+            <a:pPr algn="r"/>
+            <a:r>
+              <a:rPr lang="en-US">
+                <a:latin typeface="Anonymous Pro" panose="02060609030202000504" pitchFamily="49" charset="0"/>
+                <a:ea typeface="Anonymous Pro" panose="02060609030202000504" pitchFamily="49" charset="0"/>
+              </a:rPr>
+              <a:t>D6</a:t>
+            </a:r>
+          </a:p>
+        </p:txBody>
+      </p:sp>
+      <p:sp>
+        <p:nvSpPr>
+          <p:cNvPr id="95" name="TextBox 94">
+            <a:extLst>
+              <a:ext uri="{FF2B5EF4-FFF2-40B4-BE49-F238E27FC236}">
+                <a16:creationId xmlns:a16="http://schemas.microsoft.com/office/drawing/2014/main" id="{D6CE32EE-3B2E-4231-BB1E-2730FBD7D32A}"/>
+              </a:ext>
+            </a:extLst>
+          </p:cNvPr>
+          <p:cNvSpPr txBox="1"/>
+          <p:nvPr/>
+        </p:nvSpPr>
+        <p:spPr>
+          <a:xfrm>
+            <a:off x="4188797" y="3510828"/>
+            <a:ext cx="437940" cy="369332"/>
+          </a:xfrm>
+          <a:prstGeom prst="rect">
+            <a:avLst/>
+          </a:prstGeom>
+          <a:noFill/>
+        </p:spPr>
+        <p:txBody>
+          <a:bodyPr wrap="none" rtlCol="0">
+            <a:spAutoFit/>
+          </a:bodyPr>
+          <a:lstStyle/>
+          <a:p>
+            <a:pPr algn="r"/>
+            <a:r>
+              <a:rPr lang="en-US">
+                <a:latin typeface="Anonymous Pro" panose="02060609030202000504" pitchFamily="49" charset="0"/>
+                <a:ea typeface="Anonymous Pro" panose="02060609030202000504" pitchFamily="49" charset="0"/>
+              </a:rPr>
+              <a:t>D7</a:t>
+            </a:r>
+          </a:p>
+        </p:txBody>
+      </p:sp>
+      <p:sp>
+        <p:nvSpPr>
+          <p:cNvPr id="96" name="TextBox 95">
+            <a:extLst>
+              <a:ext uri="{FF2B5EF4-FFF2-40B4-BE49-F238E27FC236}">
+                <a16:creationId xmlns:a16="http://schemas.microsoft.com/office/drawing/2014/main" id="{28DFD821-EFD9-43F4-915C-F4C2DA1F90A3}"/>
+              </a:ext>
+            </a:extLst>
+          </p:cNvPr>
+          <p:cNvSpPr txBox="1"/>
+          <p:nvPr/>
+        </p:nvSpPr>
+        <p:spPr>
+          <a:xfrm>
+            <a:off x="4062159" y="3967910"/>
+            <a:ext cx="564578" cy="369332"/>
+          </a:xfrm>
+          <a:prstGeom prst="rect">
+            <a:avLst/>
+          </a:prstGeom>
+          <a:noFill/>
+        </p:spPr>
+        <p:txBody>
+          <a:bodyPr wrap="none" rtlCol="0">
+            <a:spAutoFit/>
+          </a:bodyPr>
+          <a:lstStyle/>
+          <a:p>
+            <a:pPr algn="r"/>
+            <a:r>
+              <a:rPr lang="en-US">
+                <a:latin typeface="Anonymous Pro" panose="02060609030202000504" pitchFamily="49" charset="0"/>
+                <a:ea typeface="Anonymous Pro" panose="02060609030202000504" pitchFamily="49" charset="0"/>
+              </a:rPr>
+              <a:t>CEP</a:t>
+            </a:r>
+          </a:p>
+        </p:txBody>
+      </p:sp>
+      <p:sp>
+        <p:nvSpPr>
+          <p:cNvPr id="97" name="TextBox 96">
+            <a:extLst>
+              <a:ext uri="{FF2B5EF4-FFF2-40B4-BE49-F238E27FC236}">
+                <a16:creationId xmlns:a16="http://schemas.microsoft.com/office/drawing/2014/main" id="{0EC3D167-F546-4D45-B86F-D777657DB8DF}"/>
+              </a:ext>
+            </a:extLst>
+          </p:cNvPr>
+          <p:cNvSpPr txBox="1"/>
+          <p:nvPr/>
+        </p:nvSpPr>
+        <p:spPr>
+          <a:xfrm>
+            <a:off x="4062159" y="4190931"/>
+            <a:ext cx="564578" cy="369332"/>
+          </a:xfrm>
+          <a:prstGeom prst="rect">
+            <a:avLst/>
+          </a:prstGeom>
+          <a:noFill/>
+        </p:spPr>
+        <p:txBody>
+          <a:bodyPr wrap="none" rtlCol="0">
+            <a:spAutoFit/>
+          </a:bodyPr>
+          <a:lstStyle/>
+          <a:p>
+            <a:pPr algn="r"/>
+            <a:r>
+              <a:rPr lang="en-US">
+                <a:latin typeface="Anonymous Pro" panose="02060609030202000504" pitchFamily="49" charset="0"/>
+                <a:ea typeface="Anonymous Pro" panose="02060609030202000504" pitchFamily="49" charset="0"/>
+              </a:rPr>
+              <a:t>CET</a:t>
+            </a:r>
+          </a:p>
+        </p:txBody>
+      </p:sp>
+      <p:sp>
+        <p:nvSpPr>
+          <p:cNvPr id="99" name="TextBox 98">
+            <a:extLst>
+              <a:ext uri="{FF2B5EF4-FFF2-40B4-BE49-F238E27FC236}">
+                <a16:creationId xmlns:a16="http://schemas.microsoft.com/office/drawing/2014/main" id="{3ACE6F09-37E5-4EB2-B461-E3ACC8917CED}"/>
+              </a:ext>
+            </a:extLst>
+          </p:cNvPr>
+          <p:cNvSpPr txBox="1"/>
+          <p:nvPr/>
+        </p:nvSpPr>
+        <p:spPr>
+          <a:xfrm>
+            <a:off x="5018441" y="5326021"/>
+            <a:ext cx="564578" cy="369332"/>
+          </a:xfrm>
+          <a:prstGeom prst="rect">
+            <a:avLst/>
+          </a:prstGeom>
+          <a:noFill/>
+        </p:spPr>
+        <p:txBody>
+          <a:bodyPr wrap="none" rtlCol="0">
+            <a:spAutoFit/>
+          </a:bodyPr>
+          <a:lstStyle/>
+          <a:p>
+            <a:r>
+              <a:rPr lang="en-US">
+                <a:latin typeface="Anonymous Pro" panose="02060609030202000504" pitchFamily="49" charset="0"/>
+                <a:ea typeface="Anonymous Pro" panose="02060609030202000504" pitchFamily="49" charset="0"/>
+              </a:rPr>
+              <a:t>CLK</a:t>
+            </a:r>
+          </a:p>
+        </p:txBody>
+      </p:sp>
+      <p:sp>
+        <p:nvSpPr>
+          <p:cNvPr id="2" name="Isosceles Triangle 1">
+            <a:extLst>
+              <a:ext uri="{FF2B5EF4-FFF2-40B4-BE49-F238E27FC236}">
+                <a16:creationId xmlns:a16="http://schemas.microsoft.com/office/drawing/2014/main" id="{737BBD63-51A3-4BD7-A230-E14D436C9BE5}"/>
+              </a:ext>
+            </a:extLst>
+          </p:cNvPr>
+          <p:cNvSpPr/>
+          <p:nvPr/>
+        </p:nvSpPr>
+        <p:spPr>
+          <a:xfrm>
+            <a:off x="5229177" y="4873602"/>
+            <a:ext cx="130137" cy="94345"/>
+          </a:xfrm>
+          <a:prstGeom prst="triangle">
+            <a:avLst/>
+          </a:prstGeom>
+          <a:noFill/>
+          <a:ln w="12700">
+            <a:solidFill>
+              <a:schemeClr val="tx1"/>
+            </a:solidFill>
+          </a:ln>
+        </p:spPr>
+        <p:style>
+          <a:lnRef idx="2">
+            <a:schemeClr val="accent1">
+              <a:shade val="50000"/>
+            </a:schemeClr>
+          </a:lnRef>
+          <a:fillRef idx="1">
+            <a:schemeClr val="accent1"/>
+          </a:fillRef>
+          <a:effectRef idx="0">
+            <a:schemeClr val="accent1"/>
+          </a:effectRef>
+          <a:fontRef idx="minor">
+            <a:schemeClr val="lt1"/>
+          </a:fontRef>
+        </p:style>
+        <p:txBody>
+          <a:bodyPr rtlCol="0" anchor="ctr"/>
+          <a:lstStyle/>
+          <a:p>
+            <a:pPr algn="ctr"/>
+            <a:endParaRPr lang="en-US"/>
+          </a:p>
+        </p:txBody>
+      </p:sp>
+      <p:cxnSp>
+        <p:nvCxnSpPr>
+          <p:cNvPr id="98" name="Straight Connector 97">
+            <a:extLst>
+              <a:ext uri="{FF2B5EF4-FFF2-40B4-BE49-F238E27FC236}">
+                <a16:creationId xmlns:a16="http://schemas.microsoft.com/office/drawing/2014/main" id="{4DA2A78B-3F2D-42D8-849E-6A0B06E03F87}"/>
+              </a:ext>
+            </a:extLst>
+          </p:cNvPr>
+          <p:cNvCxnSpPr>
+            <a:cxnSpLocks/>
+          </p:cNvCxnSpPr>
+          <p:nvPr/>
+        </p:nvCxnSpPr>
+        <p:spPr>
+          <a:xfrm>
+            <a:off x="4541447" y="4603612"/>
+            <a:ext cx="457200" cy="0"/>
+          </a:xfrm>
+          <a:prstGeom prst="line">
+            <a:avLst/>
+          </a:prstGeom>
+          <a:ln w="19050">
+            <a:solidFill>
+              <a:schemeClr val="tx1"/>
+            </a:solidFill>
+          </a:ln>
+        </p:spPr>
+        <p:style>
+          <a:lnRef idx="1">
+            <a:schemeClr val="accent1"/>
+          </a:lnRef>
+          <a:fillRef idx="0">
+            <a:schemeClr val="accent1"/>
+          </a:fillRef>
+          <a:effectRef idx="0">
+            <a:schemeClr val="accent1"/>
+          </a:effectRef>
+          <a:fontRef idx="minor">
+            <a:schemeClr val="tx1"/>
+          </a:fontRef>
+        </p:style>
+      </p:cxnSp>
+      <p:sp>
+        <p:nvSpPr>
+          <p:cNvPr id="104" name="TextBox 103">
+            <a:extLst>
+              <a:ext uri="{FF2B5EF4-FFF2-40B4-BE49-F238E27FC236}">
+                <a16:creationId xmlns:a16="http://schemas.microsoft.com/office/drawing/2014/main" id="{8DFE4906-B024-4E74-BEF7-BDE38B17FEDF}"/>
+              </a:ext>
+            </a:extLst>
+          </p:cNvPr>
+          <p:cNvSpPr txBox="1"/>
+          <p:nvPr/>
+        </p:nvSpPr>
+        <p:spPr>
+          <a:xfrm>
+            <a:off x="4188797" y="4402797"/>
+            <a:ext cx="437940" cy="369332"/>
+          </a:xfrm>
+          <a:prstGeom prst="rect">
+            <a:avLst/>
+          </a:prstGeom>
+          <a:noFill/>
+        </p:spPr>
+        <p:txBody>
+          <a:bodyPr wrap="none" rtlCol="0">
+            <a:spAutoFit/>
+          </a:bodyPr>
+          <a:lstStyle/>
+          <a:p>
+            <a:pPr algn="r"/>
+            <a:r>
+              <a:rPr lang="en-US">
+                <a:latin typeface="Anonymous Pro" panose="02060609030202000504" pitchFamily="49" charset="0"/>
+                <a:ea typeface="Anonymous Pro" panose="02060609030202000504" pitchFamily="49" charset="0"/>
+              </a:rPr>
+              <a:t>PE</a:t>
+            </a:r>
+          </a:p>
+        </p:txBody>
+      </p:sp>
+      <p:cxnSp>
+        <p:nvCxnSpPr>
+          <p:cNvPr id="106" name="Straight Connector 105">
+            <a:extLst>
+              <a:ext uri="{FF2B5EF4-FFF2-40B4-BE49-F238E27FC236}">
+                <a16:creationId xmlns:a16="http://schemas.microsoft.com/office/drawing/2014/main" id="{42C30114-6FF8-4A2A-BDBE-F7947513E00F}"/>
+              </a:ext>
+            </a:extLst>
+          </p:cNvPr>
+          <p:cNvCxnSpPr>
+            <a:cxnSpLocks/>
+          </p:cNvCxnSpPr>
+          <p:nvPr/>
+        </p:nvCxnSpPr>
+        <p:spPr>
+          <a:xfrm>
+            <a:off x="4541447" y="4798322"/>
+            <a:ext cx="457200" cy="0"/>
+          </a:xfrm>
+          <a:prstGeom prst="line">
+            <a:avLst/>
+          </a:prstGeom>
+          <a:ln w="19050">
+            <a:solidFill>
+              <a:schemeClr val="tx1"/>
+            </a:solidFill>
+          </a:ln>
+        </p:spPr>
+        <p:style>
+          <a:lnRef idx="1">
+            <a:schemeClr val="accent1"/>
+          </a:lnRef>
+          <a:fillRef idx="0">
+            <a:schemeClr val="accent1"/>
+          </a:fillRef>
+          <a:effectRef idx="0">
+            <a:schemeClr val="accent1"/>
+          </a:effectRef>
+          <a:fontRef idx="minor">
+            <a:schemeClr val="tx1"/>
+          </a:fontRef>
+        </p:style>
+      </p:cxnSp>
+      <p:sp>
+        <p:nvSpPr>
+          <p:cNvPr id="107" name="TextBox 106">
+            <a:extLst>
+              <a:ext uri="{FF2B5EF4-FFF2-40B4-BE49-F238E27FC236}">
+                <a16:creationId xmlns:a16="http://schemas.microsoft.com/office/drawing/2014/main" id="{018D1125-9801-4679-A9D3-0BEE9596538F}"/>
+              </a:ext>
+            </a:extLst>
+          </p:cNvPr>
+          <p:cNvSpPr txBox="1"/>
+          <p:nvPr/>
+        </p:nvSpPr>
+        <p:spPr>
+          <a:xfrm>
+            <a:off x="4188797" y="4598618"/>
+            <a:ext cx="437940" cy="369332"/>
+          </a:xfrm>
+          <a:prstGeom prst="rect">
+            <a:avLst/>
+          </a:prstGeom>
+          <a:noFill/>
+        </p:spPr>
+        <p:txBody>
+          <a:bodyPr wrap="none" rtlCol="0">
+            <a:spAutoFit/>
+          </a:bodyPr>
+          <a:lstStyle/>
+          <a:p>
+            <a:pPr algn="r"/>
+            <a:r>
+              <a:rPr lang="en-US">
+                <a:latin typeface="Anonymous Pro" panose="02060609030202000504" pitchFamily="49" charset="0"/>
+                <a:ea typeface="Anonymous Pro" panose="02060609030202000504" pitchFamily="49" charset="0"/>
+              </a:rPr>
+              <a:t>U/D</a:t>
+            </a:r>
+          </a:p>
+        </p:txBody>
+      </p:sp>
+      <p:cxnSp>
+        <p:nvCxnSpPr>
+          <p:cNvPr id="110" name="Straight Connector 109">
+            <a:extLst>
+              <a:ext uri="{FF2B5EF4-FFF2-40B4-BE49-F238E27FC236}">
+                <a16:creationId xmlns:a16="http://schemas.microsoft.com/office/drawing/2014/main" id="{01D5B15B-0110-44DD-8ADA-405E0F69DB8F}"/>
+              </a:ext>
+            </a:extLst>
+          </p:cNvPr>
+          <p:cNvCxnSpPr>
+            <a:cxnSpLocks/>
+          </p:cNvCxnSpPr>
+          <p:nvPr/>
+        </p:nvCxnSpPr>
+        <p:spPr>
+          <a:xfrm rot="10800000">
+            <a:off x="6869723" y="4442151"/>
+            <a:ext cx="457200" cy="0"/>
+          </a:xfrm>
+          <a:prstGeom prst="line">
+            <a:avLst/>
+          </a:prstGeom>
+          <a:ln w="19050">
+            <a:solidFill>
+              <a:schemeClr val="tx1"/>
+            </a:solidFill>
+          </a:ln>
+        </p:spPr>
+        <p:style>
+          <a:lnRef idx="1">
+            <a:schemeClr val="accent1"/>
+          </a:lnRef>
+          <a:fillRef idx="0">
+            <a:schemeClr val="accent1"/>
+          </a:fillRef>
+          <a:effectRef idx="0">
+            <a:schemeClr val="accent1"/>
+          </a:effectRef>
+          <a:fontRef idx="minor">
+            <a:schemeClr val="tx1"/>
+          </a:fontRef>
+        </p:style>
+      </p:cxnSp>
+      <p:sp>
+        <p:nvSpPr>
+          <p:cNvPr id="111" name="TextBox 110">
+            <a:extLst>
+              <a:ext uri="{FF2B5EF4-FFF2-40B4-BE49-F238E27FC236}">
+                <a16:creationId xmlns:a16="http://schemas.microsoft.com/office/drawing/2014/main" id="{25591CC7-9C52-417E-80E5-ACEF443E950F}"/>
+              </a:ext>
+            </a:extLst>
+          </p:cNvPr>
+          <p:cNvSpPr txBox="1"/>
+          <p:nvPr/>
+        </p:nvSpPr>
+        <p:spPr>
+          <a:xfrm>
+            <a:off x="7283086" y="4229286"/>
+            <a:ext cx="437940" cy="369332"/>
+          </a:xfrm>
+          <a:prstGeom prst="rect">
+            <a:avLst/>
+          </a:prstGeom>
+          <a:noFill/>
+        </p:spPr>
+        <p:txBody>
+          <a:bodyPr wrap="none" rtlCol="0">
+            <a:spAutoFit/>
+          </a:bodyPr>
+          <a:lstStyle/>
+          <a:p>
+            <a:r>
+              <a:rPr lang="en-US">
+                <a:latin typeface="Anonymous Pro" panose="02060609030202000504" pitchFamily="49" charset="0"/>
+                <a:ea typeface="Anonymous Pro" panose="02060609030202000504" pitchFamily="49" charset="0"/>
+              </a:rPr>
+              <a:t>TC</a:t>
+            </a:r>
+          </a:p>
+        </p:txBody>
+      </p:sp>
+    </p:spTree>
+    <p:extLst>
+      <p:ext uri="{BB962C8B-B14F-4D97-AF65-F5344CB8AC3E}">
+        <p14:creationId xmlns:p14="http://schemas.microsoft.com/office/powerpoint/2010/main" val="3932391040"/>
       </p:ext>
     </p:extLst>
   </p:cSld>

</xml_diff>

<commit_message>
all items added; version 0.5 for final review
</commit_message>
<xml_diff>
--- a/LSD07/img/figures.pptx
+++ b/LSD07/img/figures.pptx
@@ -6452,7 +6452,7 @@
         </p:nvCxnSpPr>
         <p:spPr>
           <a:xfrm>
-            <a:off x="4541447" y="2155097"/>
+            <a:off x="4550591" y="2155097"/>
             <a:ext cx="457200" cy="0"/>
           </a:xfrm>
           <a:prstGeom prst="line">
@@ -6495,7 +6495,7 @@
         </p:nvCxnSpPr>
         <p:spPr>
           <a:xfrm>
-            <a:off x="4541447" y="2378874"/>
+            <a:off x="4550591" y="2378874"/>
             <a:ext cx="457200" cy="0"/>
           </a:xfrm>
           <a:prstGeom prst="line">
@@ -6538,7 +6538,7 @@
         </p:nvCxnSpPr>
         <p:spPr>
           <a:xfrm>
-            <a:off x="4541447" y="2602651"/>
+            <a:off x="4550591" y="2602651"/>
             <a:ext cx="457200" cy="0"/>
           </a:xfrm>
           <a:prstGeom prst="line">
@@ -6581,7 +6581,7 @@
         </p:nvCxnSpPr>
         <p:spPr>
           <a:xfrm>
-            <a:off x="4541447" y="2826428"/>
+            <a:off x="4550591" y="2826428"/>
             <a:ext cx="457200" cy="0"/>
           </a:xfrm>
           <a:prstGeom prst="line">
@@ -6624,7 +6624,7 @@
         </p:nvCxnSpPr>
         <p:spPr>
           <a:xfrm>
-            <a:off x="4541447" y="3050205"/>
+            <a:off x="4550591" y="3050205"/>
             <a:ext cx="457200" cy="0"/>
           </a:xfrm>
           <a:prstGeom prst="line">
@@ -6667,7 +6667,7 @@
         </p:nvCxnSpPr>
         <p:spPr>
           <a:xfrm>
-            <a:off x="4541447" y="3273982"/>
+            <a:off x="4550591" y="3273982"/>
             <a:ext cx="457200" cy="0"/>
           </a:xfrm>
           <a:prstGeom prst="line">
@@ -6710,7 +6710,7 @@
         </p:nvCxnSpPr>
         <p:spPr>
           <a:xfrm>
-            <a:off x="4541447" y="3497759"/>
+            <a:off x="4550591" y="3497759"/>
             <a:ext cx="457200" cy="0"/>
           </a:xfrm>
           <a:prstGeom prst="line">
@@ -6753,7 +6753,7 @@
         </p:nvCxnSpPr>
         <p:spPr>
           <a:xfrm>
-            <a:off x="4541447" y="3721535"/>
+            <a:off x="4550591" y="3721535"/>
             <a:ext cx="457200" cy="0"/>
           </a:xfrm>
           <a:prstGeom prst="line">
@@ -6796,7 +6796,7 @@
         </p:nvCxnSpPr>
         <p:spPr>
           <a:xfrm>
-            <a:off x="4541447" y="4168905"/>
+            <a:off x="4550591" y="4168905"/>
             <a:ext cx="457200" cy="0"/>
           </a:xfrm>
           <a:prstGeom prst="line">
@@ -6839,7 +6839,7 @@
         </p:nvCxnSpPr>
         <p:spPr>
           <a:xfrm>
-            <a:off x="4541447" y="4392681"/>
+            <a:off x="4550591" y="4392681"/>
             <a:ext cx="457200" cy="0"/>
           </a:xfrm>
           <a:prstGeom prst="line">
@@ -7247,7 +7247,7 @@
         </p:nvCxnSpPr>
         <p:spPr>
           <a:xfrm rot="5400000">
-            <a:off x="5065646" y="5191723"/>
+            <a:off x="5734434" y="5191723"/>
             <a:ext cx="457200" cy="0"/>
           </a:xfrm>
           <a:prstGeom prst="line">
@@ -7288,7 +7288,7 @@
         </p:nvGrpSpPr>
         <p:grpSpPr>
           <a:xfrm>
-            <a:off x="5513928" y="2177698"/>
+            <a:off x="5513928" y="2390170"/>
             <a:ext cx="854144" cy="1071127"/>
             <a:chOff x="6163641" y="850352"/>
             <a:chExt cx="854144" cy="1071127"/>
@@ -7793,7 +7793,7 @@
         </p:nvGrpSpPr>
         <p:grpSpPr>
           <a:xfrm>
-            <a:off x="5513928" y="3321554"/>
+            <a:off x="5513928" y="3534026"/>
             <a:ext cx="854144" cy="1071127"/>
             <a:chOff x="6163641" y="850352"/>
             <a:chExt cx="854144" cy="1071127"/>
@@ -8602,7 +8602,7 @@
         </p:nvSpPr>
         <p:spPr>
           <a:xfrm>
-            <a:off x="4169537" y="1949699"/>
+            <a:off x="4178681" y="1949699"/>
             <a:ext cx="457200" cy="369332"/>
           </a:xfrm>
           <a:prstGeom prst="rect">
@@ -8641,7 +8641,7 @@
         </p:nvSpPr>
         <p:spPr>
           <a:xfrm>
-            <a:off x="4188797" y="2172717"/>
+            <a:off x="4197941" y="2172717"/>
             <a:ext cx="437940" cy="369332"/>
           </a:xfrm>
           <a:prstGeom prst="rect">
@@ -8680,7 +8680,7 @@
         </p:nvSpPr>
         <p:spPr>
           <a:xfrm>
-            <a:off x="4188797" y="2395735"/>
+            <a:off x="4197941" y="2395735"/>
             <a:ext cx="437940" cy="369332"/>
           </a:xfrm>
           <a:prstGeom prst="rect">
@@ -8719,7 +8719,7 @@
         </p:nvSpPr>
         <p:spPr>
           <a:xfrm>
-            <a:off x="4188797" y="2618753"/>
+            <a:off x="4197941" y="2618753"/>
             <a:ext cx="437940" cy="369332"/>
           </a:xfrm>
           <a:prstGeom prst="rect">
@@ -8758,7 +8758,7 @@
         </p:nvSpPr>
         <p:spPr>
           <a:xfrm>
-            <a:off x="4188797" y="2841771"/>
+            <a:off x="4197941" y="2841771"/>
             <a:ext cx="437940" cy="369332"/>
           </a:xfrm>
           <a:prstGeom prst="rect">
@@ -8797,7 +8797,7 @@
         </p:nvSpPr>
         <p:spPr>
           <a:xfrm>
-            <a:off x="4188797" y="3064789"/>
+            <a:off x="4197941" y="3064789"/>
             <a:ext cx="437940" cy="369332"/>
           </a:xfrm>
           <a:prstGeom prst="rect">
@@ -8836,7 +8836,7 @@
         </p:nvSpPr>
         <p:spPr>
           <a:xfrm>
-            <a:off x="4188797" y="3287807"/>
+            <a:off x="4197941" y="3287807"/>
             <a:ext cx="437940" cy="369332"/>
           </a:xfrm>
           <a:prstGeom prst="rect">
@@ -8875,7 +8875,7 @@
         </p:nvSpPr>
         <p:spPr>
           <a:xfrm>
-            <a:off x="4188797" y="3510828"/>
+            <a:off x="4197941" y="3510828"/>
             <a:ext cx="437940" cy="369332"/>
           </a:xfrm>
           <a:prstGeom prst="rect">
@@ -8914,7 +8914,7 @@
         </p:nvSpPr>
         <p:spPr>
           <a:xfrm>
-            <a:off x="4062159" y="3967910"/>
+            <a:off x="4071303" y="3967910"/>
             <a:ext cx="564578" cy="369332"/>
           </a:xfrm>
           <a:prstGeom prst="rect">
@@ -8953,7 +8953,7 @@
         </p:nvSpPr>
         <p:spPr>
           <a:xfrm>
-            <a:off x="4062159" y="4190931"/>
+            <a:off x="4071303" y="4190931"/>
             <a:ext cx="564578" cy="369332"/>
           </a:xfrm>
           <a:prstGeom prst="rect">
@@ -8992,7 +8992,7 @@
         </p:nvSpPr>
         <p:spPr>
           <a:xfrm>
-            <a:off x="5018441" y="5326021"/>
+            <a:off x="5687229" y="5326021"/>
             <a:ext cx="564578" cy="369332"/>
           </a:xfrm>
           <a:prstGeom prst="rect">
@@ -9030,7 +9030,7 @@
         </p:nvSpPr>
         <p:spPr>
           <a:xfrm>
-            <a:off x="5229177" y="4873602"/>
+            <a:off x="5897965" y="4873602"/>
             <a:ext cx="130137" cy="94345"/>
           </a:xfrm>
           <a:prstGeom prst="triangle">
@@ -9084,7 +9084,7 @@
         </p:nvCxnSpPr>
         <p:spPr>
           <a:xfrm>
-            <a:off x="4541447" y="4603612"/>
+            <a:off x="4550591" y="4603612"/>
             <a:ext cx="457200" cy="0"/>
           </a:xfrm>
           <a:prstGeom prst="line">
@@ -9125,7 +9125,7 @@
         </p:nvSpPr>
         <p:spPr>
           <a:xfrm>
-            <a:off x="4188797" y="4402797"/>
+            <a:off x="4197941" y="4402797"/>
             <a:ext cx="437940" cy="369332"/>
           </a:xfrm>
           <a:prstGeom prst="rect">
@@ -9166,7 +9166,7 @@
         </p:nvCxnSpPr>
         <p:spPr>
           <a:xfrm>
-            <a:off x="4541447" y="4798322"/>
+            <a:off x="4550591" y="4798322"/>
             <a:ext cx="457200" cy="0"/>
           </a:xfrm>
           <a:prstGeom prst="line">

</xml_diff>